<commit_message>
Changed the saved directories of the csv files, and also the powerpoint.
</commit_message>
<xml_diff>
--- a/Apresentação/Oficina.pptx
+++ b/Apresentação/Oficina.pptx
@@ -4,10 +4,13 @@
   <p:sldMasterIdLst>
     <p:sldMasterId id="2147485077" r:id="rId1"/>
   </p:sldMasterIdLst>
+  <p:notesMasterIdLst>
+    <p:notesMasterId r:id="rId28"/>
+  </p:notesMasterIdLst>
   <p:sldIdLst>
     <p:sldId id="256" r:id="rId2"/>
-    <p:sldId id="257" r:id="rId3"/>
-    <p:sldId id="258" r:id="rId4"/>
+    <p:sldId id="258" r:id="rId3"/>
+    <p:sldId id="257" r:id="rId4"/>
     <p:sldId id="259" r:id="rId5"/>
     <p:sldId id="260" r:id="rId6"/>
     <p:sldId id="261" r:id="rId7"/>
@@ -26,12 +29,11 @@
     <p:sldId id="284" r:id="rId20"/>
     <p:sldId id="285" r:id="rId21"/>
     <p:sldId id="272" r:id="rId22"/>
-    <p:sldId id="273" r:id="rId23"/>
-    <p:sldId id="274" r:id="rId24"/>
+    <p:sldId id="274" r:id="rId23"/>
+    <p:sldId id="273" r:id="rId24"/>
     <p:sldId id="275" r:id="rId25"/>
     <p:sldId id="276" r:id="rId26"/>
     <p:sldId id="277" r:id="rId27"/>
-    <p:sldId id="278" r:id="rId28"/>
   </p:sldIdLst>
   <p:sldSz cx="12192000" cy="6858000"/>
   <p:notesSz cx="6858000" cy="9144000"/>
@@ -136,6 +138,2140 @@
     </p:ext>
   </p:extLst>
 </p:presentation>
+</file>
+
+<file path=ppt/notesMasters/notesMaster1.xml><?xml version="1.0" encoding="utf-8"?>
+<p:notesMaster xmlns:a="http://schemas.openxmlformats.org/drawingml/2006/main" xmlns:r="http://schemas.openxmlformats.org/officeDocument/2006/relationships" xmlns:p="http://schemas.openxmlformats.org/presentationml/2006/main">
+  <p:cSld>
+    <p:bg>
+      <p:bgRef idx="1001">
+        <a:schemeClr val="bg1"/>
+      </p:bgRef>
+    </p:bg>
+    <p:spTree>
+      <p:nvGrpSpPr>
+        <p:cNvPr id="1" name=""/>
+        <p:cNvGrpSpPr/>
+        <p:nvPr/>
+      </p:nvGrpSpPr>
+      <p:grpSpPr>
+        <a:xfrm>
+          <a:off x="0" y="0"/>
+          <a:ext cx="0" cy="0"/>
+          <a:chOff x="0" y="0"/>
+          <a:chExt cx="0" cy="0"/>
+        </a:xfrm>
+      </p:grpSpPr>
+      <p:sp>
+        <p:nvSpPr>
+          <p:cNvPr id="2" name="Espaço Reservado para Cabeçalho 1"/>
+          <p:cNvSpPr>
+            <a:spLocks noGrp="1"/>
+          </p:cNvSpPr>
+          <p:nvPr>
+            <p:ph type="hdr" sz="quarter"/>
+          </p:nvPr>
+        </p:nvSpPr>
+        <p:spPr>
+          <a:xfrm>
+            <a:off x="0" y="0"/>
+            <a:ext cx="2971800" cy="458788"/>
+          </a:xfrm>
+          <a:prstGeom prst="rect">
+            <a:avLst/>
+          </a:prstGeom>
+        </p:spPr>
+        <p:txBody>
+          <a:bodyPr vert="horz" lIns="91440" tIns="45720" rIns="91440" bIns="45720" rtlCol="0"/>
+          <a:lstStyle>
+            <a:lvl1pPr algn="l">
+              <a:defRPr sz="1200"/>
+            </a:lvl1pPr>
+          </a:lstStyle>
+          <a:p>
+            <a:endParaRPr lang="pt-BR"/>
+          </a:p>
+        </p:txBody>
+      </p:sp>
+      <p:sp>
+        <p:nvSpPr>
+          <p:cNvPr id="3" name="Espaço Reservado para Data 2"/>
+          <p:cNvSpPr>
+            <a:spLocks noGrp="1"/>
+          </p:cNvSpPr>
+          <p:nvPr>
+            <p:ph type="dt" idx="1"/>
+          </p:nvPr>
+        </p:nvSpPr>
+        <p:spPr>
+          <a:xfrm>
+            <a:off x="3884613" y="0"/>
+            <a:ext cx="2971800" cy="458788"/>
+          </a:xfrm>
+          <a:prstGeom prst="rect">
+            <a:avLst/>
+          </a:prstGeom>
+        </p:spPr>
+        <p:txBody>
+          <a:bodyPr vert="horz" lIns="91440" tIns="45720" rIns="91440" bIns="45720" rtlCol="0"/>
+          <a:lstStyle>
+            <a:lvl1pPr algn="r">
+              <a:defRPr sz="1200"/>
+            </a:lvl1pPr>
+          </a:lstStyle>
+          <a:p>
+            <a:fld id="{27A81335-DCD4-104C-B80D-8B1C5DC279F7}" type="datetimeFigureOut">
+              <a:rPr lang="pt-BR" smtClean="0"/>
+              <a:t>25/01/2018</a:t>
+            </a:fld>
+            <a:endParaRPr lang="pt-BR"/>
+          </a:p>
+        </p:txBody>
+      </p:sp>
+      <p:sp>
+        <p:nvSpPr>
+          <p:cNvPr id="4" name="Espaço Reservado para Imagem de Slide 3"/>
+          <p:cNvSpPr>
+            <a:spLocks noGrp="1" noRot="1" noChangeAspect="1"/>
+          </p:cNvSpPr>
+          <p:nvPr>
+            <p:ph type="sldImg" idx="2"/>
+          </p:nvPr>
+        </p:nvSpPr>
+        <p:spPr>
+          <a:xfrm>
+            <a:off x="685800" y="1143000"/>
+            <a:ext cx="5486400" cy="3086100"/>
+          </a:xfrm>
+          <a:prstGeom prst="rect">
+            <a:avLst/>
+          </a:prstGeom>
+          <a:noFill/>
+          <a:ln w="12700">
+            <a:solidFill>
+              <a:prstClr val="black"/>
+            </a:solidFill>
+          </a:ln>
+        </p:spPr>
+        <p:txBody>
+          <a:bodyPr vert="horz" lIns="91440" tIns="45720" rIns="91440" bIns="45720" rtlCol="0" anchor="ctr"/>
+          <a:lstStyle/>
+          <a:p>
+            <a:endParaRPr lang="pt-BR"/>
+          </a:p>
+        </p:txBody>
+      </p:sp>
+      <p:sp>
+        <p:nvSpPr>
+          <p:cNvPr id="5" name="Espaço Reservado para Anotações 4"/>
+          <p:cNvSpPr>
+            <a:spLocks noGrp="1"/>
+          </p:cNvSpPr>
+          <p:nvPr>
+            <p:ph type="body" sz="quarter" idx="3"/>
+          </p:nvPr>
+        </p:nvSpPr>
+        <p:spPr>
+          <a:xfrm>
+            <a:off x="685800" y="4400550"/>
+            <a:ext cx="5486400" cy="3600450"/>
+          </a:xfrm>
+          <a:prstGeom prst="rect">
+            <a:avLst/>
+          </a:prstGeom>
+        </p:spPr>
+        <p:txBody>
+          <a:bodyPr vert="horz" lIns="91440" tIns="45720" rIns="91440" bIns="45720" rtlCol="0"/>
+          <a:lstStyle/>
+          <a:p>
+            <a:pPr lvl="0"/>
+            <a:r>
+              <a:rPr lang="pt-BR" smtClean="0"/>
+              <a:t>Clique para editar os estilos de texto mestres</a:t>
+            </a:r>
+          </a:p>
+          <a:p>
+            <a:pPr lvl="1"/>
+            <a:r>
+              <a:rPr lang="pt-BR" smtClean="0"/>
+              <a:t>Segundo nível</a:t>
+            </a:r>
+          </a:p>
+          <a:p>
+            <a:pPr lvl="2"/>
+            <a:r>
+              <a:rPr lang="pt-BR" smtClean="0"/>
+              <a:t>Terceiro nível</a:t>
+            </a:r>
+          </a:p>
+          <a:p>
+            <a:pPr lvl="3"/>
+            <a:r>
+              <a:rPr lang="pt-BR" smtClean="0"/>
+              <a:t>Quarto nível</a:t>
+            </a:r>
+          </a:p>
+          <a:p>
+            <a:pPr lvl="4"/>
+            <a:r>
+              <a:rPr lang="pt-BR" smtClean="0"/>
+              <a:t>Quinto nível</a:t>
+            </a:r>
+            <a:endParaRPr lang="pt-BR"/>
+          </a:p>
+        </p:txBody>
+      </p:sp>
+      <p:sp>
+        <p:nvSpPr>
+          <p:cNvPr id="6" name="Espaço Reservado para Rodapé 5"/>
+          <p:cNvSpPr>
+            <a:spLocks noGrp="1"/>
+          </p:cNvSpPr>
+          <p:nvPr>
+            <p:ph type="ftr" sz="quarter" idx="4"/>
+          </p:nvPr>
+        </p:nvSpPr>
+        <p:spPr>
+          <a:xfrm>
+            <a:off x="0" y="8685213"/>
+            <a:ext cx="2971800" cy="458787"/>
+          </a:xfrm>
+          <a:prstGeom prst="rect">
+            <a:avLst/>
+          </a:prstGeom>
+        </p:spPr>
+        <p:txBody>
+          <a:bodyPr vert="horz" lIns="91440" tIns="45720" rIns="91440" bIns="45720" rtlCol="0" anchor="b"/>
+          <a:lstStyle>
+            <a:lvl1pPr algn="l">
+              <a:defRPr sz="1200"/>
+            </a:lvl1pPr>
+          </a:lstStyle>
+          <a:p>
+            <a:endParaRPr lang="pt-BR"/>
+          </a:p>
+        </p:txBody>
+      </p:sp>
+      <p:sp>
+        <p:nvSpPr>
+          <p:cNvPr id="7" name="Espaço Reservado para Número de Slide 6"/>
+          <p:cNvSpPr>
+            <a:spLocks noGrp="1"/>
+          </p:cNvSpPr>
+          <p:nvPr>
+            <p:ph type="sldNum" sz="quarter" idx="5"/>
+          </p:nvPr>
+        </p:nvSpPr>
+        <p:spPr>
+          <a:xfrm>
+            <a:off x="3884613" y="8685213"/>
+            <a:ext cx="2971800" cy="458787"/>
+          </a:xfrm>
+          <a:prstGeom prst="rect">
+            <a:avLst/>
+          </a:prstGeom>
+        </p:spPr>
+        <p:txBody>
+          <a:bodyPr vert="horz" lIns="91440" tIns="45720" rIns="91440" bIns="45720" rtlCol="0" anchor="b"/>
+          <a:lstStyle>
+            <a:lvl1pPr algn="r">
+              <a:defRPr sz="1200"/>
+            </a:lvl1pPr>
+          </a:lstStyle>
+          <a:p>
+            <a:fld id="{18DD5218-A00C-7B4C-A0C7-9F9418E1D0E0}" type="slidenum">
+              <a:rPr lang="pt-BR" smtClean="0"/>
+              <a:t>‹n.º›</a:t>
+            </a:fld>
+            <a:endParaRPr lang="pt-BR"/>
+          </a:p>
+        </p:txBody>
+      </p:sp>
+    </p:spTree>
+    <p:extLst>
+      <p:ext uri="{BB962C8B-B14F-4D97-AF65-F5344CB8AC3E}">
+        <p14:creationId xmlns:p14="http://schemas.microsoft.com/office/powerpoint/2010/main" val="1827336327"/>
+      </p:ext>
+    </p:extLst>
+  </p:cSld>
+  <p:clrMap bg1="lt1" tx1="dk1" bg2="lt2" tx2="dk2" accent1="accent1" accent2="accent2" accent3="accent3" accent4="accent4" accent5="accent5" accent6="accent6" hlink="hlink" folHlink="folHlink"/>
+  <p:notesStyle>
+    <a:lvl1pPr marL="0" algn="l" defTabSz="914400" rtl="0" eaLnBrk="1" latinLnBrk="0" hangingPunct="1">
+      <a:defRPr sz="1200" kern="1200">
+        <a:solidFill>
+          <a:schemeClr val="tx1"/>
+        </a:solidFill>
+        <a:latin typeface="+mn-lt"/>
+        <a:ea typeface="+mn-ea"/>
+        <a:cs typeface="+mn-cs"/>
+      </a:defRPr>
+    </a:lvl1pPr>
+    <a:lvl2pPr marL="457200" algn="l" defTabSz="914400" rtl="0" eaLnBrk="1" latinLnBrk="0" hangingPunct="1">
+      <a:defRPr sz="1200" kern="1200">
+        <a:solidFill>
+          <a:schemeClr val="tx1"/>
+        </a:solidFill>
+        <a:latin typeface="+mn-lt"/>
+        <a:ea typeface="+mn-ea"/>
+        <a:cs typeface="+mn-cs"/>
+      </a:defRPr>
+    </a:lvl2pPr>
+    <a:lvl3pPr marL="914400" algn="l" defTabSz="914400" rtl="0" eaLnBrk="1" latinLnBrk="0" hangingPunct="1">
+      <a:defRPr sz="1200" kern="1200">
+        <a:solidFill>
+          <a:schemeClr val="tx1"/>
+        </a:solidFill>
+        <a:latin typeface="+mn-lt"/>
+        <a:ea typeface="+mn-ea"/>
+        <a:cs typeface="+mn-cs"/>
+      </a:defRPr>
+    </a:lvl3pPr>
+    <a:lvl4pPr marL="1371600" algn="l" defTabSz="914400" rtl="0" eaLnBrk="1" latinLnBrk="0" hangingPunct="1">
+      <a:defRPr sz="1200" kern="1200">
+        <a:solidFill>
+          <a:schemeClr val="tx1"/>
+        </a:solidFill>
+        <a:latin typeface="+mn-lt"/>
+        <a:ea typeface="+mn-ea"/>
+        <a:cs typeface="+mn-cs"/>
+      </a:defRPr>
+    </a:lvl4pPr>
+    <a:lvl5pPr marL="1828800" algn="l" defTabSz="914400" rtl="0" eaLnBrk="1" latinLnBrk="0" hangingPunct="1">
+      <a:defRPr sz="1200" kern="1200">
+        <a:solidFill>
+          <a:schemeClr val="tx1"/>
+        </a:solidFill>
+        <a:latin typeface="+mn-lt"/>
+        <a:ea typeface="+mn-ea"/>
+        <a:cs typeface="+mn-cs"/>
+      </a:defRPr>
+    </a:lvl5pPr>
+    <a:lvl6pPr marL="2286000" algn="l" defTabSz="914400" rtl="0" eaLnBrk="1" latinLnBrk="0" hangingPunct="1">
+      <a:defRPr sz="1200" kern="1200">
+        <a:solidFill>
+          <a:schemeClr val="tx1"/>
+        </a:solidFill>
+        <a:latin typeface="+mn-lt"/>
+        <a:ea typeface="+mn-ea"/>
+        <a:cs typeface="+mn-cs"/>
+      </a:defRPr>
+    </a:lvl6pPr>
+    <a:lvl7pPr marL="2743200" algn="l" defTabSz="914400" rtl="0" eaLnBrk="1" latinLnBrk="0" hangingPunct="1">
+      <a:defRPr sz="1200" kern="1200">
+        <a:solidFill>
+          <a:schemeClr val="tx1"/>
+        </a:solidFill>
+        <a:latin typeface="+mn-lt"/>
+        <a:ea typeface="+mn-ea"/>
+        <a:cs typeface="+mn-cs"/>
+      </a:defRPr>
+    </a:lvl7pPr>
+    <a:lvl8pPr marL="3200400" algn="l" defTabSz="914400" rtl="0" eaLnBrk="1" latinLnBrk="0" hangingPunct="1">
+      <a:defRPr sz="1200" kern="1200">
+        <a:solidFill>
+          <a:schemeClr val="tx1"/>
+        </a:solidFill>
+        <a:latin typeface="+mn-lt"/>
+        <a:ea typeface="+mn-ea"/>
+        <a:cs typeface="+mn-cs"/>
+      </a:defRPr>
+    </a:lvl8pPr>
+    <a:lvl9pPr marL="3657600" algn="l" defTabSz="914400" rtl="0" eaLnBrk="1" latinLnBrk="0" hangingPunct="1">
+      <a:defRPr sz="1200" kern="1200">
+        <a:solidFill>
+          <a:schemeClr val="tx1"/>
+        </a:solidFill>
+        <a:latin typeface="+mn-lt"/>
+        <a:ea typeface="+mn-ea"/>
+        <a:cs typeface="+mn-cs"/>
+      </a:defRPr>
+    </a:lvl9pPr>
+  </p:notesStyle>
+</p:notesMaster>
+</file>
+
+<file path=ppt/notesSlides/notesSlide1.xml><?xml version="1.0" encoding="utf-8"?>
+<p:notes xmlns:a="http://schemas.openxmlformats.org/drawingml/2006/main" xmlns:r="http://schemas.openxmlformats.org/officeDocument/2006/relationships" xmlns:p="http://schemas.openxmlformats.org/presentationml/2006/main">
+  <p:cSld>
+    <p:spTree>
+      <p:nvGrpSpPr>
+        <p:cNvPr id="1" name=""/>
+        <p:cNvGrpSpPr/>
+        <p:nvPr/>
+      </p:nvGrpSpPr>
+      <p:grpSpPr>
+        <a:xfrm>
+          <a:off x="0" y="0"/>
+          <a:ext cx="0" cy="0"/>
+          <a:chOff x="0" y="0"/>
+          <a:chExt cx="0" cy="0"/>
+        </a:xfrm>
+      </p:grpSpPr>
+      <p:sp>
+        <p:nvSpPr>
+          <p:cNvPr id="2" name="Espaço Reservado para Imagem de Slide 1"/>
+          <p:cNvSpPr>
+            <a:spLocks noGrp="1" noRot="1" noChangeAspect="1"/>
+          </p:cNvSpPr>
+          <p:nvPr>
+            <p:ph type="sldImg"/>
+          </p:nvPr>
+        </p:nvSpPr>
+        <p:spPr/>
+      </p:sp>
+      <p:sp>
+        <p:nvSpPr>
+          <p:cNvPr id="3" name="Espaço Reservado para Anotações 2"/>
+          <p:cNvSpPr>
+            <a:spLocks noGrp="1"/>
+          </p:cNvSpPr>
+          <p:nvPr>
+            <p:ph type="body" idx="1"/>
+          </p:nvPr>
+        </p:nvSpPr>
+        <p:spPr/>
+        <p:txBody>
+          <a:bodyPr/>
+          <a:lstStyle/>
+          <a:p>
+            <a:r>
+              <a:rPr lang="pt-BR" dirty="0" smtClean="0"/>
+              <a:t>O tema deste projeto </a:t>
+            </a:r>
+            <a:r>
+              <a:rPr lang="pt-BR" dirty="0" smtClean="0"/>
+              <a:t>é a</a:t>
+            </a:r>
+            <a:r>
+              <a:rPr lang="pt-BR" baseline="0" dirty="0" smtClean="0"/>
+              <a:t> oficina da porta aberta;</a:t>
+            </a:r>
+          </a:p>
+          <a:p>
+            <a:endParaRPr lang="pt-BR" dirty="0"/>
+          </a:p>
+        </p:txBody>
+      </p:sp>
+      <p:sp>
+        <p:nvSpPr>
+          <p:cNvPr id="4" name="Espaço Reservado para Número de Slide 3"/>
+          <p:cNvSpPr>
+            <a:spLocks noGrp="1"/>
+          </p:cNvSpPr>
+          <p:nvPr>
+            <p:ph type="sldNum" sz="quarter" idx="10"/>
+          </p:nvPr>
+        </p:nvSpPr>
+        <p:spPr/>
+        <p:txBody>
+          <a:bodyPr/>
+          <a:lstStyle/>
+          <a:p>
+            <a:fld id="{18DD5218-A00C-7B4C-A0C7-9F9418E1D0E0}" type="slidenum">
+              <a:rPr lang="pt-BR" smtClean="0"/>
+              <a:t>1</a:t>
+            </a:fld>
+            <a:endParaRPr lang="pt-BR"/>
+          </a:p>
+        </p:txBody>
+      </p:sp>
+    </p:spTree>
+    <p:extLst>
+      <p:ext uri="{BB962C8B-B14F-4D97-AF65-F5344CB8AC3E}">
+        <p14:creationId xmlns:p14="http://schemas.microsoft.com/office/powerpoint/2010/main" val="572660336"/>
+      </p:ext>
+    </p:extLst>
+  </p:cSld>
+  <p:clrMapOvr>
+    <a:masterClrMapping/>
+  </p:clrMapOvr>
+</p:notes>
+</file>
+
+<file path=ppt/notesSlides/notesSlide10.xml><?xml version="1.0" encoding="utf-8"?>
+<p:notes xmlns:a="http://schemas.openxmlformats.org/drawingml/2006/main" xmlns:r="http://schemas.openxmlformats.org/officeDocument/2006/relationships" xmlns:p="http://schemas.openxmlformats.org/presentationml/2006/main">
+  <p:cSld>
+    <p:spTree>
+      <p:nvGrpSpPr>
+        <p:cNvPr id="1" name=""/>
+        <p:cNvGrpSpPr/>
+        <p:nvPr/>
+      </p:nvGrpSpPr>
+      <p:grpSpPr>
+        <a:xfrm>
+          <a:off x="0" y="0"/>
+          <a:ext cx="0" cy="0"/>
+          <a:chOff x="0" y="0"/>
+          <a:chExt cx="0" cy="0"/>
+        </a:xfrm>
+      </p:grpSpPr>
+      <p:sp>
+        <p:nvSpPr>
+          <p:cNvPr id="2" name="Espaço Reservado para Imagem de Slide 1"/>
+          <p:cNvSpPr>
+            <a:spLocks noGrp="1" noRot="1" noChangeAspect="1"/>
+          </p:cNvSpPr>
+          <p:nvPr>
+            <p:ph type="sldImg"/>
+          </p:nvPr>
+        </p:nvSpPr>
+        <p:spPr/>
+      </p:sp>
+      <p:sp>
+        <p:nvSpPr>
+          <p:cNvPr id="3" name="Espaço Reservado para Anotações 2"/>
+          <p:cNvSpPr>
+            <a:spLocks noGrp="1"/>
+          </p:cNvSpPr>
+          <p:nvPr>
+            <p:ph type="body" idx="1"/>
+          </p:nvPr>
+        </p:nvSpPr>
+        <p:spPr/>
+        <p:txBody>
+          <a:bodyPr/>
+          <a:lstStyle/>
+          <a:p>
+            <a:r>
+              <a:rPr lang="pt-BR" dirty="0" smtClean="0"/>
+              <a:t>- Referir</a:t>
+            </a:r>
+            <a:r>
+              <a:rPr lang="pt-BR" baseline="0" dirty="0" smtClean="0"/>
+              <a:t> que deve-se </a:t>
+            </a:r>
+            <a:r>
+              <a:rPr lang="pt-BR" baseline="0" dirty="0" smtClean="0"/>
+              <a:t>à relação de </a:t>
+            </a:r>
+            <a:r>
+              <a:rPr lang="pt-BR" baseline="0" dirty="0" err="1" smtClean="0"/>
+              <a:t>m:n</a:t>
+            </a:r>
+            <a:r>
+              <a:rPr lang="pt-BR" baseline="0" dirty="0" smtClean="0"/>
+              <a:t>;</a:t>
+            </a:r>
+          </a:p>
+          <a:p>
+            <a:r>
+              <a:rPr lang="pt-BR" baseline="0" dirty="0" smtClean="0"/>
+              <a:t>- chave primária composta pelas chaves estrangeiras id </a:t>
+            </a:r>
+            <a:r>
+              <a:rPr lang="pt-BR" baseline="0" dirty="0" err="1" smtClean="0"/>
+              <a:t>funcionario</a:t>
+            </a:r>
+            <a:r>
+              <a:rPr lang="pt-BR" baseline="0" dirty="0" smtClean="0"/>
+              <a:t> e id serviço.</a:t>
+            </a:r>
+          </a:p>
+        </p:txBody>
+      </p:sp>
+      <p:sp>
+        <p:nvSpPr>
+          <p:cNvPr id="4" name="Espaço Reservado para Número de Slide 3"/>
+          <p:cNvSpPr>
+            <a:spLocks noGrp="1"/>
+          </p:cNvSpPr>
+          <p:nvPr>
+            <p:ph type="sldNum" sz="quarter" idx="10"/>
+          </p:nvPr>
+        </p:nvSpPr>
+        <p:spPr/>
+        <p:txBody>
+          <a:bodyPr/>
+          <a:lstStyle/>
+          <a:p>
+            <a:fld id="{18DD5218-A00C-7B4C-A0C7-9F9418E1D0E0}" type="slidenum">
+              <a:rPr lang="pt-BR" smtClean="0"/>
+              <a:t>15</a:t>
+            </a:fld>
+            <a:endParaRPr lang="pt-BR"/>
+          </a:p>
+        </p:txBody>
+      </p:sp>
+    </p:spTree>
+    <p:extLst>
+      <p:ext uri="{BB962C8B-B14F-4D97-AF65-F5344CB8AC3E}">
+        <p14:creationId xmlns:p14="http://schemas.microsoft.com/office/powerpoint/2010/main" val="1034949299"/>
+      </p:ext>
+    </p:extLst>
+  </p:cSld>
+  <p:clrMapOvr>
+    <a:masterClrMapping/>
+  </p:clrMapOvr>
+</p:notes>
+</file>
+
+<file path=ppt/notesSlides/notesSlide11.xml><?xml version="1.0" encoding="utf-8"?>
+<p:notes xmlns:a="http://schemas.openxmlformats.org/drawingml/2006/main" xmlns:r="http://schemas.openxmlformats.org/officeDocument/2006/relationships" xmlns:p="http://schemas.openxmlformats.org/presentationml/2006/main">
+  <p:cSld>
+    <p:spTree>
+      <p:nvGrpSpPr>
+        <p:cNvPr id="1" name=""/>
+        <p:cNvGrpSpPr/>
+        <p:nvPr/>
+      </p:nvGrpSpPr>
+      <p:grpSpPr>
+        <a:xfrm>
+          <a:off x="0" y="0"/>
+          <a:ext cx="0" cy="0"/>
+          <a:chOff x="0" y="0"/>
+          <a:chExt cx="0" cy="0"/>
+        </a:xfrm>
+      </p:grpSpPr>
+      <p:sp>
+        <p:nvSpPr>
+          <p:cNvPr id="2" name="Espaço Reservado para Imagem de Slide 1"/>
+          <p:cNvSpPr>
+            <a:spLocks noGrp="1" noRot="1" noChangeAspect="1"/>
+          </p:cNvSpPr>
+          <p:nvPr>
+            <p:ph type="sldImg"/>
+          </p:nvPr>
+        </p:nvSpPr>
+        <p:spPr/>
+      </p:sp>
+      <p:sp>
+        <p:nvSpPr>
+          <p:cNvPr id="3" name="Espaço Reservado para Anotações 2"/>
+          <p:cNvSpPr>
+            <a:spLocks noGrp="1"/>
+          </p:cNvSpPr>
+          <p:nvPr>
+            <p:ph type="body" idx="1"/>
+          </p:nvPr>
+        </p:nvSpPr>
+        <p:spPr/>
+        <p:txBody>
+          <a:bodyPr/>
+          <a:lstStyle/>
+          <a:p>
+            <a:endParaRPr lang="pt-BR" dirty="0"/>
+          </a:p>
+        </p:txBody>
+      </p:sp>
+      <p:sp>
+        <p:nvSpPr>
+          <p:cNvPr id="4" name="Espaço Reservado para Número de Slide 3"/>
+          <p:cNvSpPr>
+            <a:spLocks noGrp="1"/>
+          </p:cNvSpPr>
+          <p:nvPr>
+            <p:ph type="sldNum" sz="quarter" idx="10"/>
+          </p:nvPr>
+        </p:nvSpPr>
+        <p:spPr/>
+        <p:txBody>
+          <a:bodyPr/>
+          <a:lstStyle/>
+          <a:p>
+            <a:fld id="{18DD5218-A00C-7B4C-A0C7-9F9418E1D0E0}" type="slidenum">
+              <a:rPr lang="pt-BR" smtClean="0"/>
+              <a:t>16</a:t>
+            </a:fld>
+            <a:endParaRPr lang="pt-BR"/>
+          </a:p>
+        </p:txBody>
+      </p:sp>
+    </p:spTree>
+    <p:extLst>
+      <p:ext uri="{BB962C8B-B14F-4D97-AF65-F5344CB8AC3E}">
+        <p14:creationId xmlns:p14="http://schemas.microsoft.com/office/powerpoint/2010/main" val="654887343"/>
+      </p:ext>
+    </p:extLst>
+  </p:cSld>
+  <p:clrMapOvr>
+    <a:masterClrMapping/>
+  </p:clrMapOvr>
+</p:notes>
+</file>
+
+<file path=ppt/notesSlides/notesSlide12.xml><?xml version="1.0" encoding="utf-8"?>
+<p:notes xmlns:a="http://schemas.openxmlformats.org/drawingml/2006/main" xmlns:r="http://schemas.openxmlformats.org/officeDocument/2006/relationships" xmlns:p="http://schemas.openxmlformats.org/presentationml/2006/main">
+  <p:cSld>
+    <p:spTree>
+      <p:nvGrpSpPr>
+        <p:cNvPr id="1" name=""/>
+        <p:cNvGrpSpPr/>
+        <p:nvPr/>
+      </p:nvGrpSpPr>
+      <p:grpSpPr>
+        <a:xfrm>
+          <a:off x="0" y="0"/>
+          <a:ext cx="0" cy="0"/>
+          <a:chOff x="0" y="0"/>
+          <a:chExt cx="0" cy="0"/>
+        </a:xfrm>
+      </p:grpSpPr>
+      <p:sp>
+        <p:nvSpPr>
+          <p:cNvPr id="2" name="Espaço Reservado para Imagem de Slide 1"/>
+          <p:cNvSpPr>
+            <a:spLocks noGrp="1" noRot="1" noChangeAspect="1"/>
+          </p:cNvSpPr>
+          <p:nvPr>
+            <p:ph type="sldImg"/>
+          </p:nvPr>
+        </p:nvSpPr>
+        <p:spPr/>
+      </p:sp>
+      <p:sp>
+        <p:nvSpPr>
+          <p:cNvPr id="3" name="Espaço Reservado para Anotações 2"/>
+          <p:cNvSpPr>
+            <a:spLocks noGrp="1"/>
+          </p:cNvSpPr>
+          <p:nvPr>
+            <p:ph type="body" idx="1"/>
+          </p:nvPr>
+        </p:nvSpPr>
+        <p:spPr/>
+        <p:txBody>
+          <a:bodyPr/>
+          <a:lstStyle/>
+          <a:p>
+            <a:r>
+              <a:rPr lang="pt-BR" dirty="0" smtClean="0"/>
+              <a:t>- </a:t>
+            </a:r>
+            <a:r>
+              <a:rPr lang="pt-BR" dirty="0" err="1" smtClean="0"/>
+              <a:t>concluido</a:t>
+            </a:r>
+            <a:r>
+              <a:rPr lang="pt-BR" dirty="0" smtClean="0"/>
+              <a:t> o modelo logico;</a:t>
+            </a:r>
+          </a:p>
+          <a:p>
+            <a:r>
+              <a:rPr lang="pt-BR" dirty="0" smtClean="0"/>
+              <a:t>- analise de viabilidade;</a:t>
+            </a:r>
+          </a:p>
+          <a:p>
+            <a:r>
+              <a:rPr lang="pt-BR" dirty="0" smtClean="0"/>
+              <a:t>-</a:t>
+            </a:r>
+            <a:r>
+              <a:rPr lang="pt-BR" baseline="0" dirty="0" smtClean="0"/>
+              <a:t> verificar se </a:t>
+            </a:r>
+            <a:r>
+              <a:rPr lang="pt-BR" baseline="0" dirty="0" smtClean="0"/>
+              <a:t>é </a:t>
+            </a:r>
+            <a:r>
+              <a:rPr lang="pt-BR" baseline="0" dirty="0" err="1" smtClean="0"/>
+              <a:t>possivel</a:t>
+            </a:r>
+            <a:r>
+              <a:rPr lang="pt-BR" baseline="0" dirty="0" smtClean="0"/>
+              <a:t> corresponder aos requisitos do </a:t>
+            </a:r>
+            <a:r>
+              <a:rPr lang="pt-BR" baseline="0" dirty="0" err="1" smtClean="0"/>
+              <a:t>Sr.Lourenço</a:t>
+            </a:r>
+            <a:r>
+              <a:rPr lang="pt-BR" baseline="0" dirty="0" smtClean="0"/>
+              <a:t>.</a:t>
+            </a:r>
+            <a:endParaRPr lang="pt-BR" dirty="0"/>
+          </a:p>
+        </p:txBody>
+      </p:sp>
+      <p:sp>
+        <p:nvSpPr>
+          <p:cNvPr id="4" name="Espaço Reservado para Número de Slide 3"/>
+          <p:cNvSpPr>
+            <a:spLocks noGrp="1"/>
+          </p:cNvSpPr>
+          <p:nvPr>
+            <p:ph type="sldNum" sz="quarter" idx="10"/>
+          </p:nvPr>
+        </p:nvSpPr>
+        <p:spPr/>
+        <p:txBody>
+          <a:bodyPr/>
+          <a:lstStyle/>
+          <a:p>
+            <a:fld id="{18DD5218-A00C-7B4C-A0C7-9F9418E1D0E0}" type="slidenum">
+              <a:rPr lang="pt-BR" smtClean="0"/>
+              <a:t>17</a:t>
+            </a:fld>
+            <a:endParaRPr lang="pt-BR"/>
+          </a:p>
+        </p:txBody>
+      </p:sp>
+    </p:spTree>
+    <p:extLst>
+      <p:ext uri="{BB962C8B-B14F-4D97-AF65-F5344CB8AC3E}">
+        <p14:creationId xmlns:p14="http://schemas.microsoft.com/office/powerpoint/2010/main" val="1529195746"/>
+      </p:ext>
+    </p:extLst>
+  </p:cSld>
+  <p:clrMapOvr>
+    <a:masterClrMapping/>
+  </p:clrMapOvr>
+</p:notes>
+</file>
+
+<file path=ppt/notesSlides/notesSlide13.xml><?xml version="1.0" encoding="utf-8"?>
+<p:notes xmlns:a="http://schemas.openxmlformats.org/drawingml/2006/main" xmlns:r="http://schemas.openxmlformats.org/officeDocument/2006/relationships" xmlns:p="http://schemas.openxmlformats.org/presentationml/2006/main">
+  <p:cSld>
+    <p:spTree>
+      <p:nvGrpSpPr>
+        <p:cNvPr id="1" name=""/>
+        <p:cNvGrpSpPr/>
+        <p:nvPr/>
+      </p:nvGrpSpPr>
+      <p:grpSpPr>
+        <a:xfrm>
+          <a:off x="0" y="0"/>
+          <a:ext cx="0" cy="0"/>
+          <a:chOff x="0" y="0"/>
+          <a:chExt cx="0" cy="0"/>
+        </a:xfrm>
+      </p:grpSpPr>
+      <p:sp>
+        <p:nvSpPr>
+          <p:cNvPr id="2" name="Espaço Reservado para Imagem de Slide 1"/>
+          <p:cNvSpPr>
+            <a:spLocks noGrp="1" noRot="1" noChangeAspect="1"/>
+          </p:cNvSpPr>
+          <p:nvPr>
+            <p:ph type="sldImg"/>
+          </p:nvPr>
+        </p:nvSpPr>
+        <p:spPr/>
+      </p:sp>
+      <p:sp>
+        <p:nvSpPr>
+          <p:cNvPr id="3" name="Espaço Reservado para Anotações 2"/>
+          <p:cNvSpPr>
+            <a:spLocks noGrp="1"/>
+          </p:cNvSpPr>
+          <p:nvPr>
+            <p:ph type="body" idx="1"/>
+          </p:nvPr>
+        </p:nvSpPr>
+        <p:spPr/>
+        <p:txBody>
+          <a:bodyPr/>
+          <a:lstStyle/>
+          <a:p>
+            <a:r>
+              <a:rPr lang="pt-BR" dirty="0" smtClean="0"/>
+              <a:t>- Crescimento da</a:t>
+            </a:r>
+            <a:r>
+              <a:rPr lang="pt-BR" baseline="0" dirty="0" smtClean="0"/>
+              <a:t> oficina.</a:t>
+            </a:r>
+          </a:p>
+          <a:p>
+            <a:r>
+              <a:rPr lang="pt-BR" baseline="0" dirty="0" smtClean="0"/>
+              <a:t>- primeiramente nacional;</a:t>
+            </a:r>
+          </a:p>
+          <a:p>
+            <a:r>
+              <a:rPr lang="pt-BR" baseline="0" dirty="0" smtClean="0"/>
+              <a:t>- depois internacional.</a:t>
+            </a:r>
+          </a:p>
+          <a:p>
+            <a:r>
+              <a:rPr lang="pt-BR" baseline="0" dirty="0" smtClean="0"/>
+              <a:t>- grande volume de dados.</a:t>
+            </a:r>
+          </a:p>
+          <a:p>
+            <a:r>
+              <a:rPr lang="pt-BR" baseline="0" dirty="0" smtClean="0"/>
+              <a:t>- queixas do </a:t>
+            </a:r>
+            <a:r>
+              <a:rPr lang="pt-BR" baseline="0" dirty="0" err="1" smtClean="0"/>
+              <a:t>sr.lourenlo</a:t>
+            </a:r>
+            <a:r>
+              <a:rPr lang="pt-BR" baseline="0" dirty="0" smtClean="0"/>
+              <a:t> devido </a:t>
+            </a:r>
+            <a:r>
+              <a:rPr lang="pt-BR" baseline="0" dirty="0" smtClean="0"/>
+              <a:t>à </a:t>
+            </a:r>
+            <a:r>
+              <a:rPr lang="pt-BR" baseline="0" dirty="0" err="1" smtClean="0"/>
+              <a:t>lentidao</a:t>
+            </a:r>
+            <a:r>
+              <a:rPr lang="pt-BR" baseline="0" dirty="0" smtClean="0"/>
+              <a:t> do sistema.</a:t>
+            </a:r>
+            <a:endParaRPr lang="pt-BR" baseline="0" dirty="0" smtClean="0"/>
+          </a:p>
+          <a:p>
+            <a:r>
+              <a:rPr lang="pt-BR" baseline="0" dirty="0" smtClean="0"/>
+              <a:t>- </a:t>
+            </a:r>
+            <a:r>
+              <a:rPr lang="pt-BR" baseline="0" dirty="0" err="1" smtClean="0"/>
+              <a:t>adoçao</a:t>
+            </a:r>
+            <a:r>
+              <a:rPr lang="pt-BR" baseline="0" dirty="0" smtClean="0"/>
+              <a:t> de modelo </a:t>
+            </a:r>
+            <a:r>
+              <a:rPr lang="pt-BR" baseline="0" dirty="0" err="1" smtClean="0"/>
+              <a:t>nao</a:t>
+            </a:r>
+            <a:r>
+              <a:rPr lang="pt-BR" baseline="0" dirty="0" smtClean="0"/>
+              <a:t> relacional.</a:t>
+            </a:r>
+            <a:endParaRPr lang="pt-BR" dirty="0"/>
+          </a:p>
+        </p:txBody>
+      </p:sp>
+      <p:sp>
+        <p:nvSpPr>
+          <p:cNvPr id="4" name="Espaço Reservado para Número de Slide 3"/>
+          <p:cNvSpPr>
+            <a:spLocks noGrp="1"/>
+          </p:cNvSpPr>
+          <p:nvPr>
+            <p:ph type="sldNum" sz="quarter" idx="10"/>
+          </p:nvPr>
+        </p:nvSpPr>
+        <p:spPr/>
+        <p:txBody>
+          <a:bodyPr/>
+          <a:lstStyle/>
+          <a:p>
+            <a:fld id="{18DD5218-A00C-7B4C-A0C7-9F9418E1D0E0}" type="slidenum">
+              <a:rPr lang="pt-BR" smtClean="0"/>
+              <a:t>22</a:t>
+            </a:fld>
+            <a:endParaRPr lang="pt-BR"/>
+          </a:p>
+        </p:txBody>
+      </p:sp>
+    </p:spTree>
+    <p:extLst>
+      <p:ext uri="{BB962C8B-B14F-4D97-AF65-F5344CB8AC3E}">
+        <p14:creationId xmlns:p14="http://schemas.microsoft.com/office/powerpoint/2010/main" val="392035568"/>
+      </p:ext>
+    </p:extLst>
+  </p:cSld>
+  <p:clrMapOvr>
+    <a:masterClrMapping/>
+  </p:clrMapOvr>
+</p:notes>
+</file>
+
+<file path=ppt/notesSlides/notesSlide14.xml><?xml version="1.0" encoding="utf-8"?>
+<p:notes xmlns:a="http://schemas.openxmlformats.org/drawingml/2006/main" xmlns:r="http://schemas.openxmlformats.org/officeDocument/2006/relationships" xmlns:p="http://schemas.openxmlformats.org/presentationml/2006/main">
+  <p:cSld>
+    <p:spTree>
+      <p:nvGrpSpPr>
+        <p:cNvPr id="1" name=""/>
+        <p:cNvGrpSpPr/>
+        <p:nvPr/>
+      </p:nvGrpSpPr>
+      <p:grpSpPr>
+        <a:xfrm>
+          <a:off x="0" y="0"/>
+          <a:ext cx="0" cy="0"/>
+          <a:chOff x="0" y="0"/>
+          <a:chExt cx="0" cy="0"/>
+        </a:xfrm>
+      </p:grpSpPr>
+      <p:sp>
+        <p:nvSpPr>
+          <p:cNvPr id="2" name="Espaço Reservado para Imagem de Slide 1"/>
+          <p:cNvSpPr>
+            <a:spLocks noGrp="1" noRot="1" noChangeAspect="1"/>
+          </p:cNvSpPr>
+          <p:nvPr>
+            <p:ph type="sldImg"/>
+          </p:nvPr>
+        </p:nvSpPr>
+        <p:spPr/>
+      </p:sp>
+      <p:sp>
+        <p:nvSpPr>
+          <p:cNvPr id="3" name="Espaço Reservado para Anotações 2"/>
+          <p:cNvSpPr>
+            <a:spLocks noGrp="1"/>
+          </p:cNvSpPr>
+          <p:nvPr>
+            <p:ph type="body" idx="1"/>
+          </p:nvPr>
+        </p:nvSpPr>
+        <p:spPr/>
+        <p:txBody>
+          <a:bodyPr/>
+          <a:lstStyle/>
+          <a:p>
+            <a:r>
+              <a:rPr lang="pt-BR" dirty="0" smtClean="0"/>
+              <a:t>- rapidez</a:t>
+            </a:r>
+            <a:r>
+              <a:rPr lang="pt-BR" baseline="0" dirty="0" smtClean="0"/>
+              <a:t> de execuç</a:t>
+            </a:r>
+            <a:r>
+              <a:rPr lang="pt-BR" baseline="0" dirty="0" smtClean="0"/>
+              <a:t>ão.</a:t>
+            </a:r>
+          </a:p>
+          <a:p>
+            <a:r>
+              <a:rPr lang="pt-BR" baseline="0" dirty="0" smtClean="0"/>
+              <a:t>- maior eficiência.</a:t>
+            </a:r>
+          </a:p>
+        </p:txBody>
+      </p:sp>
+      <p:sp>
+        <p:nvSpPr>
+          <p:cNvPr id="4" name="Espaço Reservado para Número de Slide 3"/>
+          <p:cNvSpPr>
+            <a:spLocks noGrp="1"/>
+          </p:cNvSpPr>
+          <p:nvPr>
+            <p:ph type="sldNum" sz="quarter" idx="10"/>
+          </p:nvPr>
+        </p:nvSpPr>
+        <p:spPr/>
+        <p:txBody>
+          <a:bodyPr/>
+          <a:lstStyle/>
+          <a:p>
+            <a:fld id="{18DD5218-A00C-7B4C-A0C7-9F9418E1D0E0}" type="slidenum">
+              <a:rPr lang="pt-BR" smtClean="0"/>
+              <a:t>23</a:t>
+            </a:fld>
+            <a:endParaRPr lang="pt-BR"/>
+          </a:p>
+        </p:txBody>
+      </p:sp>
+    </p:spTree>
+    <p:extLst>
+      <p:ext uri="{BB962C8B-B14F-4D97-AF65-F5344CB8AC3E}">
+        <p14:creationId xmlns:p14="http://schemas.microsoft.com/office/powerpoint/2010/main" val="1335354340"/>
+      </p:ext>
+    </p:extLst>
+  </p:cSld>
+  <p:clrMapOvr>
+    <a:masterClrMapping/>
+  </p:clrMapOvr>
+</p:notes>
+</file>
+
+<file path=ppt/notesSlides/notesSlide15.xml><?xml version="1.0" encoding="utf-8"?>
+<p:notes xmlns:a="http://schemas.openxmlformats.org/drawingml/2006/main" xmlns:r="http://schemas.openxmlformats.org/officeDocument/2006/relationships" xmlns:p="http://schemas.openxmlformats.org/presentationml/2006/main">
+  <p:cSld>
+    <p:spTree>
+      <p:nvGrpSpPr>
+        <p:cNvPr id="1" name=""/>
+        <p:cNvGrpSpPr/>
+        <p:nvPr/>
+      </p:nvGrpSpPr>
+      <p:grpSpPr>
+        <a:xfrm>
+          <a:off x="0" y="0"/>
+          <a:ext cx="0" cy="0"/>
+          <a:chOff x="0" y="0"/>
+          <a:chExt cx="0" cy="0"/>
+        </a:xfrm>
+      </p:grpSpPr>
+      <p:sp>
+        <p:nvSpPr>
+          <p:cNvPr id="2" name="Espaço Reservado para Imagem de Slide 1"/>
+          <p:cNvSpPr>
+            <a:spLocks noGrp="1" noRot="1" noChangeAspect="1"/>
+          </p:cNvSpPr>
+          <p:nvPr>
+            <p:ph type="sldImg"/>
+          </p:nvPr>
+        </p:nvSpPr>
+        <p:spPr/>
+      </p:sp>
+      <p:sp>
+        <p:nvSpPr>
+          <p:cNvPr id="3" name="Espaço Reservado para Anotações 2"/>
+          <p:cNvSpPr>
+            <a:spLocks noGrp="1"/>
+          </p:cNvSpPr>
+          <p:nvPr>
+            <p:ph type="body" idx="1"/>
+          </p:nvPr>
+        </p:nvSpPr>
+        <p:spPr/>
+        <p:txBody>
+          <a:bodyPr/>
+          <a:lstStyle/>
+          <a:p>
+            <a:endParaRPr lang="pt-BR" dirty="0"/>
+          </a:p>
+        </p:txBody>
+      </p:sp>
+      <p:sp>
+        <p:nvSpPr>
+          <p:cNvPr id="4" name="Espaço Reservado para Número de Slide 3"/>
+          <p:cNvSpPr>
+            <a:spLocks noGrp="1"/>
+          </p:cNvSpPr>
+          <p:nvPr>
+            <p:ph type="sldNum" sz="quarter" idx="10"/>
+          </p:nvPr>
+        </p:nvSpPr>
+        <p:spPr/>
+        <p:txBody>
+          <a:bodyPr/>
+          <a:lstStyle/>
+          <a:p>
+            <a:fld id="{18DD5218-A00C-7B4C-A0C7-9F9418E1D0E0}" type="slidenum">
+              <a:rPr lang="pt-BR" smtClean="0"/>
+              <a:t>26</a:t>
+            </a:fld>
+            <a:endParaRPr lang="pt-BR"/>
+          </a:p>
+        </p:txBody>
+      </p:sp>
+    </p:spTree>
+    <p:extLst>
+      <p:ext uri="{BB962C8B-B14F-4D97-AF65-F5344CB8AC3E}">
+        <p14:creationId xmlns:p14="http://schemas.microsoft.com/office/powerpoint/2010/main" val="87755422"/>
+      </p:ext>
+    </p:extLst>
+  </p:cSld>
+  <p:clrMapOvr>
+    <a:masterClrMapping/>
+  </p:clrMapOvr>
+</p:notes>
+</file>
+
+<file path=ppt/notesSlides/notesSlide2.xml><?xml version="1.0" encoding="utf-8"?>
+<p:notes xmlns:a="http://schemas.openxmlformats.org/drawingml/2006/main" xmlns:r="http://schemas.openxmlformats.org/officeDocument/2006/relationships" xmlns:p="http://schemas.openxmlformats.org/presentationml/2006/main">
+  <p:cSld>
+    <p:spTree>
+      <p:nvGrpSpPr>
+        <p:cNvPr id="1" name=""/>
+        <p:cNvGrpSpPr/>
+        <p:nvPr/>
+      </p:nvGrpSpPr>
+      <p:grpSpPr>
+        <a:xfrm>
+          <a:off x="0" y="0"/>
+          <a:ext cx="0" cy="0"/>
+          <a:chOff x="0" y="0"/>
+          <a:chExt cx="0" cy="0"/>
+        </a:xfrm>
+      </p:grpSpPr>
+      <p:sp>
+        <p:nvSpPr>
+          <p:cNvPr id="2" name="Espaço Reservado para Imagem de Slide 1"/>
+          <p:cNvSpPr>
+            <a:spLocks noGrp="1" noRot="1" noChangeAspect="1"/>
+          </p:cNvSpPr>
+          <p:nvPr>
+            <p:ph type="sldImg"/>
+          </p:nvPr>
+        </p:nvSpPr>
+        <p:spPr/>
+      </p:sp>
+      <p:sp>
+        <p:nvSpPr>
+          <p:cNvPr id="3" name="Espaço Reservado para Anotações 2"/>
+          <p:cNvSpPr>
+            <a:spLocks noGrp="1"/>
+          </p:cNvSpPr>
+          <p:nvPr>
+            <p:ph type="body" idx="1"/>
+          </p:nvPr>
+        </p:nvSpPr>
+        <p:spPr/>
+        <p:txBody>
+          <a:bodyPr/>
+          <a:lstStyle/>
+          <a:p>
+            <a:r>
+              <a:rPr lang="pt-BR" dirty="0" smtClean="0"/>
+              <a:t>-</a:t>
+            </a:r>
+            <a:r>
+              <a:rPr lang="pt-BR" baseline="0" dirty="0" smtClean="0"/>
+              <a:t> Proposto pelo </a:t>
+            </a:r>
+            <a:r>
+              <a:rPr lang="pt-BR" baseline="0" dirty="0" err="1" smtClean="0"/>
+              <a:t>Sr.Lourenço</a:t>
+            </a:r>
+            <a:r>
+              <a:rPr lang="pt-BR" baseline="0" dirty="0" smtClean="0"/>
+              <a:t>;</a:t>
+            </a:r>
+          </a:p>
+          <a:p>
+            <a:r>
+              <a:rPr lang="pt-BR" baseline="0" dirty="0" smtClean="0"/>
+              <a:t>- Dificuldade em gerir serviços;</a:t>
+            </a:r>
+          </a:p>
+          <a:p>
+            <a:r>
+              <a:rPr lang="pt-BR" baseline="0" dirty="0" smtClean="0"/>
+              <a:t>- Dificuldade em saber qual ou quais funcion</a:t>
+            </a:r>
+            <a:r>
+              <a:rPr lang="pt-BR" baseline="0" dirty="0" smtClean="0"/>
+              <a:t>ários;</a:t>
+            </a:r>
+          </a:p>
+          <a:p>
+            <a:r>
+              <a:rPr lang="pt-BR" baseline="0" dirty="0" smtClean="0"/>
+              <a:t>- Melhorar organização;</a:t>
+            </a:r>
+          </a:p>
+          <a:p>
+            <a:r>
+              <a:rPr lang="pt-BR" baseline="0" dirty="0" smtClean="0"/>
+              <a:t>- Antes: Excel;</a:t>
+            </a:r>
+          </a:p>
+          <a:p>
+            <a:r>
+              <a:rPr lang="pt-BR" baseline="0" dirty="0" smtClean="0"/>
+              <a:t>- dados </a:t>
+            </a:r>
+            <a:r>
+              <a:rPr lang="pt-BR" baseline="0" dirty="0" err="1" smtClean="0"/>
+              <a:t>funcionario</a:t>
+            </a:r>
+            <a:r>
+              <a:rPr lang="pt-BR" baseline="0" dirty="0" smtClean="0"/>
+              <a:t>, veiculo, serviço, e peça;</a:t>
+            </a:r>
+          </a:p>
+          <a:p>
+            <a:r>
+              <a:rPr lang="pt-BR" baseline="0" dirty="0" smtClean="0"/>
+              <a:t>- Adoção do modelo relacional;</a:t>
+            </a:r>
+            <a:endParaRPr lang="pt-BR" dirty="0"/>
+          </a:p>
+        </p:txBody>
+      </p:sp>
+      <p:sp>
+        <p:nvSpPr>
+          <p:cNvPr id="4" name="Espaço Reservado para Número de Slide 3"/>
+          <p:cNvSpPr>
+            <a:spLocks noGrp="1"/>
+          </p:cNvSpPr>
+          <p:nvPr>
+            <p:ph type="sldNum" sz="quarter" idx="10"/>
+          </p:nvPr>
+        </p:nvSpPr>
+        <p:spPr/>
+        <p:txBody>
+          <a:bodyPr/>
+          <a:lstStyle/>
+          <a:p>
+            <a:fld id="{18DD5218-A00C-7B4C-A0C7-9F9418E1D0E0}" type="slidenum">
+              <a:rPr lang="pt-BR" smtClean="0"/>
+              <a:t>2</a:t>
+            </a:fld>
+            <a:endParaRPr lang="pt-BR"/>
+          </a:p>
+        </p:txBody>
+      </p:sp>
+    </p:spTree>
+    <p:extLst>
+      <p:ext uri="{BB962C8B-B14F-4D97-AF65-F5344CB8AC3E}">
+        <p14:creationId xmlns:p14="http://schemas.microsoft.com/office/powerpoint/2010/main" val="1159126505"/>
+      </p:ext>
+    </p:extLst>
+  </p:cSld>
+  <p:clrMapOvr>
+    <a:masterClrMapping/>
+  </p:clrMapOvr>
+</p:notes>
+</file>
+
+<file path=ppt/notesSlides/notesSlide3.xml><?xml version="1.0" encoding="utf-8"?>
+<p:notes xmlns:a="http://schemas.openxmlformats.org/drawingml/2006/main" xmlns:r="http://schemas.openxmlformats.org/officeDocument/2006/relationships" xmlns:p="http://schemas.openxmlformats.org/presentationml/2006/main">
+  <p:cSld>
+    <p:spTree>
+      <p:nvGrpSpPr>
+        <p:cNvPr id="1" name=""/>
+        <p:cNvGrpSpPr/>
+        <p:nvPr/>
+      </p:nvGrpSpPr>
+      <p:grpSpPr>
+        <a:xfrm>
+          <a:off x="0" y="0"/>
+          <a:ext cx="0" cy="0"/>
+          <a:chOff x="0" y="0"/>
+          <a:chExt cx="0" cy="0"/>
+        </a:xfrm>
+      </p:grpSpPr>
+      <p:sp>
+        <p:nvSpPr>
+          <p:cNvPr id="2" name="Espaço Reservado para Imagem de Slide 1"/>
+          <p:cNvSpPr>
+            <a:spLocks noGrp="1" noRot="1" noChangeAspect="1"/>
+          </p:cNvSpPr>
+          <p:nvPr>
+            <p:ph type="sldImg"/>
+          </p:nvPr>
+        </p:nvSpPr>
+        <p:spPr/>
+      </p:sp>
+      <p:sp>
+        <p:nvSpPr>
+          <p:cNvPr id="3" name="Espaço Reservado para Anotações 2"/>
+          <p:cNvSpPr>
+            <a:spLocks noGrp="1"/>
+          </p:cNvSpPr>
+          <p:nvPr>
+            <p:ph type="body" idx="1"/>
+          </p:nvPr>
+        </p:nvSpPr>
+        <p:spPr/>
+        <p:txBody>
+          <a:bodyPr/>
+          <a:lstStyle/>
+          <a:p>
+            <a:r>
+              <a:rPr lang="pt-BR" dirty="0" smtClean="0"/>
+              <a:t>- Justificaç</a:t>
+            </a:r>
+            <a:r>
+              <a:rPr lang="pt-BR" dirty="0" smtClean="0"/>
+              <a:t>ão: tendo</a:t>
+            </a:r>
+            <a:r>
+              <a:rPr lang="pt-BR" baseline="0" dirty="0" smtClean="0"/>
+              <a:t> em conta que é uma primeira base de dados para uma pequena oficina, o modelo relacional é o que melhor se adapta, devido às suas caraterísticas. </a:t>
+            </a:r>
+          </a:p>
+          <a:p>
+            <a:r>
+              <a:rPr lang="pt-BR" baseline="0" dirty="0" smtClean="0"/>
+              <a:t>- Pequeno volume de dados;</a:t>
+            </a:r>
+          </a:p>
+          <a:p>
+            <a:r>
+              <a:rPr lang="pt-BR" baseline="0" dirty="0" smtClean="0"/>
+              <a:t>- boa organização e eficiência;</a:t>
+            </a:r>
+          </a:p>
+          <a:p>
+            <a:pPr marL="0" marR="0" indent="0" algn="l" defTabSz="914400" rtl="0" eaLnBrk="1" fontAlgn="auto" latinLnBrk="0" hangingPunct="1">
+              <a:lnSpc>
+                <a:spcPct val="100000"/>
+              </a:lnSpc>
+              <a:spcBef>
+                <a:spcPts val="0"/>
+              </a:spcBef>
+              <a:spcAft>
+                <a:spcPts val="0"/>
+              </a:spcAft>
+              <a:buClrTx/>
+              <a:buSzTx/>
+              <a:buFontTx/>
+              <a:buNone/>
+              <a:tabLst/>
+              <a:defRPr/>
+            </a:pPr>
+            <a:r>
+              <a:rPr lang="pt-BR" baseline="0" dirty="0" smtClean="0"/>
+              <a:t>- Realização de entrevista;</a:t>
+            </a:r>
+            <a:endParaRPr lang="pt-BR" baseline="0" dirty="0" smtClean="0"/>
+          </a:p>
+          <a:p>
+            <a:r>
+              <a:rPr lang="pt-BR" baseline="0" dirty="0" smtClean="0"/>
+              <a:t>- requisitos estabelecidos pelo </a:t>
+            </a:r>
+            <a:r>
+              <a:rPr lang="pt-BR" baseline="0" dirty="0" err="1" smtClean="0"/>
+              <a:t>Sr.Lourenço</a:t>
+            </a:r>
+            <a:r>
+              <a:rPr lang="pt-BR" baseline="0" dirty="0" smtClean="0"/>
+              <a:t>;</a:t>
+            </a:r>
+          </a:p>
+          <a:p>
+            <a:endParaRPr lang="pt-BR" dirty="0"/>
+          </a:p>
+        </p:txBody>
+      </p:sp>
+      <p:sp>
+        <p:nvSpPr>
+          <p:cNvPr id="4" name="Espaço Reservado para Número de Slide 3"/>
+          <p:cNvSpPr>
+            <a:spLocks noGrp="1"/>
+          </p:cNvSpPr>
+          <p:nvPr>
+            <p:ph type="sldNum" sz="quarter" idx="10"/>
+          </p:nvPr>
+        </p:nvSpPr>
+        <p:spPr/>
+        <p:txBody>
+          <a:bodyPr/>
+          <a:lstStyle/>
+          <a:p>
+            <a:fld id="{18DD5218-A00C-7B4C-A0C7-9F9418E1D0E0}" type="slidenum">
+              <a:rPr lang="pt-BR" smtClean="0"/>
+              <a:t>3</a:t>
+            </a:fld>
+            <a:endParaRPr lang="pt-BR"/>
+          </a:p>
+        </p:txBody>
+      </p:sp>
+    </p:spTree>
+    <p:extLst>
+      <p:ext uri="{BB962C8B-B14F-4D97-AF65-F5344CB8AC3E}">
+        <p14:creationId xmlns:p14="http://schemas.microsoft.com/office/powerpoint/2010/main" val="6939507"/>
+      </p:ext>
+    </p:extLst>
+  </p:cSld>
+  <p:clrMapOvr>
+    <a:masterClrMapping/>
+  </p:clrMapOvr>
+</p:notes>
+</file>
+
+<file path=ppt/notesSlides/notesSlide4.xml><?xml version="1.0" encoding="utf-8"?>
+<p:notes xmlns:a="http://schemas.openxmlformats.org/drawingml/2006/main" xmlns:r="http://schemas.openxmlformats.org/officeDocument/2006/relationships" xmlns:p="http://schemas.openxmlformats.org/presentationml/2006/main">
+  <p:cSld>
+    <p:spTree>
+      <p:nvGrpSpPr>
+        <p:cNvPr id="1" name=""/>
+        <p:cNvGrpSpPr/>
+        <p:nvPr/>
+      </p:nvGrpSpPr>
+      <p:grpSpPr>
+        <a:xfrm>
+          <a:off x="0" y="0"/>
+          <a:ext cx="0" cy="0"/>
+          <a:chOff x="0" y="0"/>
+          <a:chExt cx="0" cy="0"/>
+        </a:xfrm>
+      </p:grpSpPr>
+      <p:sp>
+        <p:nvSpPr>
+          <p:cNvPr id="2" name="Espaço Reservado para Imagem de Slide 1"/>
+          <p:cNvSpPr>
+            <a:spLocks noGrp="1" noRot="1" noChangeAspect="1"/>
+          </p:cNvSpPr>
+          <p:nvPr>
+            <p:ph type="sldImg"/>
+          </p:nvPr>
+        </p:nvSpPr>
+        <p:spPr/>
+      </p:sp>
+      <p:sp>
+        <p:nvSpPr>
+          <p:cNvPr id="3" name="Espaço Reservado para Anotações 2"/>
+          <p:cNvSpPr>
+            <a:spLocks noGrp="1"/>
+          </p:cNvSpPr>
+          <p:nvPr>
+            <p:ph type="body" idx="1"/>
+          </p:nvPr>
+        </p:nvSpPr>
+        <p:spPr/>
+        <p:txBody>
+          <a:bodyPr/>
+          <a:lstStyle/>
+          <a:p>
+            <a:r>
+              <a:rPr lang="pt-BR" dirty="0" smtClean="0"/>
+              <a:t>- Ve</a:t>
+            </a:r>
+            <a:r>
+              <a:rPr lang="pt-BR" dirty="0" smtClean="0"/>
+              <a:t>ículo:</a:t>
+            </a:r>
+            <a:r>
+              <a:rPr lang="pt-BR" baseline="0" dirty="0" smtClean="0"/>
+              <a:t> matrícula, marca, modelo;</a:t>
+            </a:r>
+          </a:p>
+          <a:p>
+            <a:r>
+              <a:rPr lang="pt-BR" baseline="0" dirty="0" smtClean="0"/>
+              <a:t>- Funcionário: nome, </a:t>
+            </a:r>
+            <a:r>
+              <a:rPr lang="pt-BR" baseline="0" dirty="0" err="1" smtClean="0"/>
+              <a:t>contactos</a:t>
+            </a:r>
+            <a:r>
+              <a:rPr lang="pt-BR" baseline="0" dirty="0" smtClean="0"/>
+              <a:t>, </a:t>
+            </a:r>
+            <a:r>
+              <a:rPr lang="pt-BR" baseline="0" dirty="0" err="1" smtClean="0"/>
+              <a:t>email</a:t>
+            </a:r>
+            <a:r>
+              <a:rPr lang="pt-BR" baseline="0" dirty="0" smtClean="0"/>
+              <a:t>, morada e data de nascimento;</a:t>
+            </a:r>
+          </a:p>
+          <a:p>
+            <a:r>
+              <a:rPr lang="pt-BR" baseline="0" dirty="0" smtClean="0"/>
+              <a:t>- Serviço: id, data, tipo, notas;</a:t>
+            </a:r>
+          </a:p>
+          <a:p>
+            <a:r>
+              <a:rPr lang="pt-BR" baseline="0" dirty="0" smtClean="0"/>
+              <a:t>- Peça: id, nome, modelo, estado;</a:t>
+            </a:r>
+            <a:endParaRPr lang="pt-BR" dirty="0" smtClean="0"/>
+          </a:p>
+          <a:p>
+            <a:r>
+              <a:rPr lang="pt-BR" dirty="0" smtClean="0"/>
+              <a:t>- Referir que as peças da base de dados s</a:t>
+            </a:r>
+            <a:r>
+              <a:rPr lang="pt-BR" dirty="0" smtClean="0"/>
+              <a:t>ão apenas as usadas nos serviços;</a:t>
+            </a:r>
+          </a:p>
+          <a:p>
+            <a:endParaRPr lang="pt-BR" dirty="0"/>
+          </a:p>
+        </p:txBody>
+      </p:sp>
+      <p:sp>
+        <p:nvSpPr>
+          <p:cNvPr id="4" name="Espaço Reservado para Número de Slide 3"/>
+          <p:cNvSpPr>
+            <a:spLocks noGrp="1"/>
+          </p:cNvSpPr>
+          <p:nvPr>
+            <p:ph type="sldNum" sz="quarter" idx="10"/>
+          </p:nvPr>
+        </p:nvSpPr>
+        <p:spPr/>
+        <p:txBody>
+          <a:bodyPr/>
+          <a:lstStyle/>
+          <a:p>
+            <a:fld id="{18DD5218-A00C-7B4C-A0C7-9F9418E1D0E0}" type="slidenum">
+              <a:rPr lang="pt-BR" smtClean="0"/>
+              <a:t>4</a:t>
+            </a:fld>
+            <a:endParaRPr lang="pt-BR"/>
+          </a:p>
+        </p:txBody>
+      </p:sp>
+    </p:spTree>
+    <p:extLst>
+      <p:ext uri="{BB962C8B-B14F-4D97-AF65-F5344CB8AC3E}">
+        <p14:creationId xmlns:p14="http://schemas.microsoft.com/office/powerpoint/2010/main" val="740759355"/>
+      </p:ext>
+    </p:extLst>
+  </p:cSld>
+  <p:clrMapOvr>
+    <a:masterClrMapping/>
+  </p:clrMapOvr>
+</p:notes>
+</file>
+
+<file path=ppt/notesSlides/notesSlide5.xml><?xml version="1.0" encoding="utf-8"?>
+<p:notes xmlns:a="http://schemas.openxmlformats.org/drawingml/2006/main" xmlns:r="http://schemas.openxmlformats.org/officeDocument/2006/relationships" xmlns:p="http://schemas.openxmlformats.org/presentationml/2006/main">
+  <p:cSld>
+    <p:spTree>
+      <p:nvGrpSpPr>
+        <p:cNvPr id="1" name=""/>
+        <p:cNvGrpSpPr/>
+        <p:nvPr/>
+      </p:nvGrpSpPr>
+      <p:grpSpPr>
+        <a:xfrm>
+          <a:off x="0" y="0"/>
+          <a:ext cx="0" cy="0"/>
+          <a:chOff x="0" y="0"/>
+          <a:chExt cx="0" cy="0"/>
+        </a:xfrm>
+      </p:grpSpPr>
+      <p:sp>
+        <p:nvSpPr>
+          <p:cNvPr id="2" name="Espaço Reservado para Imagem de Slide 1"/>
+          <p:cNvSpPr>
+            <a:spLocks noGrp="1" noRot="1" noChangeAspect="1"/>
+          </p:cNvSpPr>
+          <p:nvPr>
+            <p:ph type="sldImg"/>
+          </p:nvPr>
+        </p:nvSpPr>
+        <p:spPr/>
+      </p:sp>
+      <p:sp>
+        <p:nvSpPr>
+          <p:cNvPr id="3" name="Espaço Reservado para Anotações 2"/>
+          <p:cNvSpPr>
+            <a:spLocks noGrp="1"/>
+          </p:cNvSpPr>
+          <p:nvPr>
+            <p:ph type="body" idx="1"/>
+          </p:nvPr>
+        </p:nvSpPr>
+        <p:spPr/>
+        <p:txBody>
+          <a:bodyPr/>
+          <a:lstStyle/>
+          <a:p>
+            <a:endParaRPr lang="pt-BR" dirty="0"/>
+          </a:p>
+        </p:txBody>
+      </p:sp>
+      <p:sp>
+        <p:nvSpPr>
+          <p:cNvPr id="4" name="Espaço Reservado para Número de Slide 3"/>
+          <p:cNvSpPr>
+            <a:spLocks noGrp="1"/>
+          </p:cNvSpPr>
+          <p:nvPr>
+            <p:ph type="sldNum" sz="quarter" idx="10"/>
+          </p:nvPr>
+        </p:nvSpPr>
+        <p:spPr/>
+        <p:txBody>
+          <a:bodyPr/>
+          <a:lstStyle/>
+          <a:p>
+            <a:fld id="{18DD5218-A00C-7B4C-A0C7-9F9418E1D0E0}" type="slidenum">
+              <a:rPr lang="pt-BR" smtClean="0"/>
+              <a:t>5</a:t>
+            </a:fld>
+            <a:endParaRPr lang="pt-BR"/>
+          </a:p>
+        </p:txBody>
+      </p:sp>
+    </p:spTree>
+    <p:extLst>
+      <p:ext uri="{BB962C8B-B14F-4D97-AF65-F5344CB8AC3E}">
+        <p14:creationId xmlns:p14="http://schemas.microsoft.com/office/powerpoint/2010/main" val="1285228804"/>
+      </p:ext>
+    </p:extLst>
+  </p:cSld>
+  <p:clrMapOvr>
+    <a:masterClrMapping/>
+  </p:clrMapOvr>
+</p:notes>
+</file>
+
+<file path=ppt/notesSlides/notesSlide6.xml><?xml version="1.0" encoding="utf-8"?>
+<p:notes xmlns:a="http://schemas.openxmlformats.org/drawingml/2006/main" xmlns:r="http://schemas.openxmlformats.org/officeDocument/2006/relationships" xmlns:p="http://schemas.openxmlformats.org/presentationml/2006/main">
+  <p:cSld>
+    <p:spTree>
+      <p:nvGrpSpPr>
+        <p:cNvPr id="1" name=""/>
+        <p:cNvGrpSpPr/>
+        <p:nvPr/>
+      </p:nvGrpSpPr>
+      <p:grpSpPr>
+        <a:xfrm>
+          <a:off x="0" y="0"/>
+          <a:ext cx="0" cy="0"/>
+          <a:chOff x="0" y="0"/>
+          <a:chExt cx="0" cy="0"/>
+        </a:xfrm>
+      </p:grpSpPr>
+      <p:sp>
+        <p:nvSpPr>
+          <p:cNvPr id="2" name="Espaço Reservado para Imagem de Slide 1"/>
+          <p:cNvSpPr>
+            <a:spLocks noGrp="1" noRot="1" noChangeAspect="1"/>
+          </p:cNvSpPr>
+          <p:nvPr>
+            <p:ph type="sldImg"/>
+          </p:nvPr>
+        </p:nvSpPr>
+        <p:spPr/>
+      </p:sp>
+      <p:sp>
+        <p:nvSpPr>
+          <p:cNvPr id="3" name="Espaço Reservado para Anotações 2"/>
+          <p:cNvSpPr>
+            <a:spLocks noGrp="1"/>
+          </p:cNvSpPr>
+          <p:nvPr>
+            <p:ph type="body" idx="1"/>
+          </p:nvPr>
+        </p:nvSpPr>
+        <p:spPr/>
+        <p:txBody>
+          <a:bodyPr/>
+          <a:lstStyle/>
+          <a:p>
+            <a:r>
+              <a:rPr lang="pt-BR" dirty="0" smtClean="0"/>
+              <a:t>- Referir que </a:t>
+            </a:r>
+            <a:r>
+              <a:rPr lang="pt-BR" dirty="0" err="1" smtClean="0"/>
+              <a:t>contactos</a:t>
+            </a:r>
+            <a:r>
+              <a:rPr lang="pt-BR" dirty="0" smtClean="0"/>
+              <a:t> n</a:t>
+            </a:r>
+            <a:r>
+              <a:rPr lang="pt-BR" dirty="0" smtClean="0"/>
+              <a:t>ão aparece em atributo, e que será</a:t>
+            </a:r>
+            <a:r>
+              <a:rPr lang="pt-BR" baseline="0" dirty="0" smtClean="0"/>
+              <a:t> explicada mais à frente a geração de uma nova tabela, por ser </a:t>
+            </a:r>
+            <a:r>
+              <a:rPr lang="pt-BR" baseline="0" dirty="0" err="1" smtClean="0"/>
+              <a:t>multi</a:t>
+            </a:r>
+            <a:r>
+              <a:rPr lang="pt-BR" baseline="0" dirty="0" smtClean="0"/>
+              <a:t>-valor.</a:t>
+            </a:r>
+            <a:endParaRPr lang="pt-BR" dirty="0"/>
+          </a:p>
+        </p:txBody>
+      </p:sp>
+      <p:sp>
+        <p:nvSpPr>
+          <p:cNvPr id="4" name="Espaço Reservado para Número de Slide 3"/>
+          <p:cNvSpPr>
+            <a:spLocks noGrp="1"/>
+          </p:cNvSpPr>
+          <p:nvPr>
+            <p:ph type="sldNum" sz="quarter" idx="10"/>
+          </p:nvPr>
+        </p:nvSpPr>
+        <p:spPr/>
+        <p:txBody>
+          <a:bodyPr/>
+          <a:lstStyle/>
+          <a:p>
+            <a:fld id="{18DD5218-A00C-7B4C-A0C7-9F9418E1D0E0}" type="slidenum">
+              <a:rPr lang="pt-BR" smtClean="0"/>
+              <a:t>10</a:t>
+            </a:fld>
+            <a:endParaRPr lang="pt-BR"/>
+          </a:p>
+        </p:txBody>
+      </p:sp>
+    </p:spTree>
+    <p:extLst>
+      <p:ext uri="{BB962C8B-B14F-4D97-AF65-F5344CB8AC3E}">
+        <p14:creationId xmlns:p14="http://schemas.microsoft.com/office/powerpoint/2010/main" val="1789376348"/>
+      </p:ext>
+    </p:extLst>
+  </p:cSld>
+  <p:clrMapOvr>
+    <a:masterClrMapping/>
+  </p:clrMapOvr>
+</p:notes>
+</file>
+
+<file path=ppt/notesSlides/notesSlide7.xml><?xml version="1.0" encoding="utf-8"?>
+<p:notes xmlns:a="http://schemas.openxmlformats.org/drawingml/2006/main" xmlns:r="http://schemas.openxmlformats.org/officeDocument/2006/relationships" xmlns:p="http://schemas.openxmlformats.org/presentationml/2006/main">
+  <p:cSld>
+    <p:spTree>
+      <p:nvGrpSpPr>
+        <p:cNvPr id="1" name=""/>
+        <p:cNvGrpSpPr/>
+        <p:nvPr/>
+      </p:nvGrpSpPr>
+      <p:grpSpPr>
+        <a:xfrm>
+          <a:off x="0" y="0"/>
+          <a:ext cx="0" cy="0"/>
+          <a:chOff x="0" y="0"/>
+          <a:chExt cx="0" cy="0"/>
+        </a:xfrm>
+      </p:grpSpPr>
+      <p:sp>
+        <p:nvSpPr>
+          <p:cNvPr id="2" name="Espaço Reservado para Imagem de Slide 1"/>
+          <p:cNvSpPr>
+            <a:spLocks noGrp="1" noRot="1" noChangeAspect="1"/>
+          </p:cNvSpPr>
+          <p:nvPr>
+            <p:ph type="sldImg"/>
+          </p:nvPr>
+        </p:nvSpPr>
+        <p:spPr/>
+      </p:sp>
+      <p:sp>
+        <p:nvSpPr>
+          <p:cNvPr id="3" name="Espaço Reservado para Anotações 2"/>
+          <p:cNvSpPr>
+            <a:spLocks noGrp="1"/>
+          </p:cNvSpPr>
+          <p:nvPr>
+            <p:ph type="body" idx="1"/>
+          </p:nvPr>
+        </p:nvSpPr>
+        <p:spPr/>
+        <p:txBody>
+          <a:bodyPr/>
+          <a:lstStyle/>
+          <a:p>
+            <a:r>
+              <a:rPr lang="pt-BR" dirty="0" smtClean="0"/>
+              <a:t>- referir que </a:t>
+            </a:r>
+            <a:r>
+              <a:rPr lang="pt-BR" dirty="0" err="1" smtClean="0"/>
+              <a:t>idVeiculo</a:t>
+            </a:r>
+            <a:r>
+              <a:rPr lang="pt-BR" dirty="0" smtClean="0"/>
+              <a:t> deve-se ao facto da</a:t>
+            </a:r>
+            <a:r>
+              <a:rPr lang="pt-BR" baseline="0" dirty="0" smtClean="0"/>
+              <a:t> relaç</a:t>
+            </a:r>
+            <a:r>
+              <a:rPr lang="pt-BR" baseline="0" dirty="0" smtClean="0"/>
+              <a:t>ão com veiculo ser de --- </a:t>
+            </a:r>
+            <a:r>
+              <a:rPr lang="pt-BR" baseline="0" dirty="0" err="1" smtClean="0"/>
+              <a:t>s</a:t>
+            </a:r>
+            <a:r>
+              <a:rPr lang="pt-BR" baseline="0" dirty="0" smtClean="0"/>
+              <a:t> N:1 </a:t>
+            </a:r>
+            <a:r>
+              <a:rPr lang="pt-BR" baseline="0" dirty="0" err="1" smtClean="0"/>
+              <a:t>v</a:t>
+            </a:r>
+            <a:r>
+              <a:rPr lang="pt-BR" baseline="0" dirty="0" smtClean="0"/>
+              <a:t>;</a:t>
+            </a:r>
+          </a:p>
+          <a:p>
+            <a:r>
+              <a:rPr lang="pt-BR" baseline="0" dirty="0" smtClean="0"/>
+              <a:t>- colocar chave estrangeira na tabela com N;</a:t>
+            </a:r>
+          </a:p>
+          <a:p>
+            <a:endParaRPr lang="pt-BR" dirty="0"/>
+          </a:p>
+        </p:txBody>
+      </p:sp>
+      <p:sp>
+        <p:nvSpPr>
+          <p:cNvPr id="4" name="Espaço Reservado para Número de Slide 3"/>
+          <p:cNvSpPr>
+            <a:spLocks noGrp="1"/>
+          </p:cNvSpPr>
+          <p:nvPr>
+            <p:ph type="sldNum" sz="quarter" idx="10"/>
+          </p:nvPr>
+        </p:nvSpPr>
+        <p:spPr/>
+        <p:txBody>
+          <a:bodyPr/>
+          <a:lstStyle/>
+          <a:p>
+            <a:fld id="{18DD5218-A00C-7B4C-A0C7-9F9418E1D0E0}" type="slidenum">
+              <a:rPr lang="pt-BR" smtClean="0"/>
+              <a:t>12</a:t>
+            </a:fld>
+            <a:endParaRPr lang="pt-BR"/>
+          </a:p>
+        </p:txBody>
+      </p:sp>
+    </p:spTree>
+    <p:extLst>
+      <p:ext uri="{BB962C8B-B14F-4D97-AF65-F5344CB8AC3E}">
+        <p14:creationId xmlns:p14="http://schemas.microsoft.com/office/powerpoint/2010/main" val="502278611"/>
+      </p:ext>
+    </p:extLst>
+  </p:cSld>
+  <p:clrMapOvr>
+    <a:masterClrMapping/>
+  </p:clrMapOvr>
+</p:notes>
+</file>
+
+<file path=ppt/notesSlides/notesSlide8.xml><?xml version="1.0" encoding="utf-8"?>
+<p:notes xmlns:a="http://schemas.openxmlformats.org/drawingml/2006/main" xmlns:r="http://schemas.openxmlformats.org/officeDocument/2006/relationships" xmlns:p="http://schemas.openxmlformats.org/presentationml/2006/main">
+  <p:cSld>
+    <p:spTree>
+      <p:nvGrpSpPr>
+        <p:cNvPr id="1" name=""/>
+        <p:cNvGrpSpPr/>
+        <p:nvPr/>
+      </p:nvGrpSpPr>
+      <p:grpSpPr>
+        <a:xfrm>
+          <a:off x="0" y="0"/>
+          <a:ext cx="0" cy="0"/>
+          <a:chOff x="0" y="0"/>
+          <a:chExt cx="0" cy="0"/>
+        </a:xfrm>
+      </p:grpSpPr>
+      <p:sp>
+        <p:nvSpPr>
+          <p:cNvPr id="2" name="Espaço Reservado para Imagem de Slide 1"/>
+          <p:cNvSpPr>
+            <a:spLocks noGrp="1" noRot="1" noChangeAspect="1"/>
+          </p:cNvSpPr>
+          <p:nvPr>
+            <p:ph type="sldImg"/>
+          </p:nvPr>
+        </p:nvSpPr>
+        <p:spPr/>
+      </p:sp>
+      <p:sp>
+        <p:nvSpPr>
+          <p:cNvPr id="3" name="Espaço Reservado para Anotações 2"/>
+          <p:cNvSpPr>
+            <a:spLocks noGrp="1"/>
+          </p:cNvSpPr>
+          <p:nvPr>
+            <p:ph type="body" idx="1"/>
+          </p:nvPr>
+        </p:nvSpPr>
+        <p:spPr/>
+        <p:txBody>
+          <a:bodyPr/>
+          <a:lstStyle/>
+          <a:p>
+            <a:r>
+              <a:rPr lang="pt-BR" dirty="0" smtClean="0"/>
+              <a:t>- </a:t>
+            </a:r>
+            <a:r>
+              <a:rPr lang="pt-BR" dirty="0" err="1" smtClean="0"/>
+              <a:t>idServiço</a:t>
+            </a:r>
+            <a:r>
+              <a:rPr lang="pt-BR" baseline="0" dirty="0" smtClean="0"/>
+              <a:t> presente devido </a:t>
+            </a:r>
+            <a:r>
+              <a:rPr lang="pt-BR" baseline="0" dirty="0" smtClean="0"/>
+              <a:t>à relação --- </a:t>
+            </a:r>
+            <a:r>
+              <a:rPr lang="pt-BR" baseline="0" dirty="0" err="1" smtClean="0"/>
+              <a:t>s</a:t>
+            </a:r>
+            <a:r>
+              <a:rPr lang="pt-BR" baseline="0" dirty="0" smtClean="0"/>
+              <a:t> 1:N p.</a:t>
+            </a:r>
+          </a:p>
+          <a:p>
+            <a:r>
+              <a:rPr lang="pt-BR" baseline="0" dirty="0" smtClean="0"/>
+              <a:t>- chave estrangeira na tabela com N;</a:t>
+            </a:r>
+            <a:endParaRPr lang="pt-BR" dirty="0"/>
+          </a:p>
+        </p:txBody>
+      </p:sp>
+      <p:sp>
+        <p:nvSpPr>
+          <p:cNvPr id="4" name="Espaço Reservado para Número de Slide 3"/>
+          <p:cNvSpPr>
+            <a:spLocks noGrp="1"/>
+          </p:cNvSpPr>
+          <p:nvPr>
+            <p:ph type="sldNum" sz="quarter" idx="10"/>
+          </p:nvPr>
+        </p:nvSpPr>
+        <p:spPr/>
+        <p:txBody>
+          <a:bodyPr/>
+          <a:lstStyle/>
+          <a:p>
+            <a:fld id="{18DD5218-A00C-7B4C-A0C7-9F9418E1D0E0}" type="slidenum">
+              <a:rPr lang="pt-BR" smtClean="0"/>
+              <a:t>13</a:t>
+            </a:fld>
+            <a:endParaRPr lang="pt-BR"/>
+          </a:p>
+        </p:txBody>
+      </p:sp>
+    </p:spTree>
+    <p:extLst>
+      <p:ext uri="{BB962C8B-B14F-4D97-AF65-F5344CB8AC3E}">
+        <p14:creationId xmlns:p14="http://schemas.microsoft.com/office/powerpoint/2010/main" val="1450573622"/>
+      </p:ext>
+    </p:extLst>
+  </p:cSld>
+  <p:clrMapOvr>
+    <a:masterClrMapping/>
+  </p:clrMapOvr>
+</p:notes>
+</file>
+
+<file path=ppt/notesSlides/notesSlide9.xml><?xml version="1.0" encoding="utf-8"?>
+<p:notes xmlns:a="http://schemas.openxmlformats.org/drawingml/2006/main" xmlns:r="http://schemas.openxmlformats.org/officeDocument/2006/relationships" xmlns:p="http://schemas.openxmlformats.org/presentationml/2006/main">
+  <p:cSld>
+    <p:spTree>
+      <p:nvGrpSpPr>
+        <p:cNvPr id="1" name=""/>
+        <p:cNvGrpSpPr/>
+        <p:nvPr/>
+      </p:nvGrpSpPr>
+      <p:grpSpPr>
+        <a:xfrm>
+          <a:off x="0" y="0"/>
+          <a:ext cx="0" cy="0"/>
+          <a:chOff x="0" y="0"/>
+          <a:chExt cx="0" cy="0"/>
+        </a:xfrm>
+      </p:grpSpPr>
+      <p:sp>
+        <p:nvSpPr>
+          <p:cNvPr id="2" name="Espaço Reservado para Imagem de Slide 1"/>
+          <p:cNvSpPr>
+            <a:spLocks noGrp="1" noRot="1" noChangeAspect="1"/>
+          </p:cNvSpPr>
+          <p:nvPr>
+            <p:ph type="sldImg"/>
+          </p:nvPr>
+        </p:nvSpPr>
+        <p:spPr/>
+      </p:sp>
+      <p:sp>
+        <p:nvSpPr>
+          <p:cNvPr id="3" name="Espaço Reservado para Anotações 2"/>
+          <p:cNvSpPr>
+            <a:spLocks noGrp="1"/>
+          </p:cNvSpPr>
+          <p:nvPr>
+            <p:ph type="body" idx="1"/>
+          </p:nvPr>
+        </p:nvSpPr>
+        <p:spPr/>
+        <p:txBody>
+          <a:bodyPr/>
+          <a:lstStyle/>
+          <a:p>
+            <a:r>
+              <a:rPr lang="pt-BR" dirty="0" smtClean="0"/>
+              <a:t>- </a:t>
+            </a:r>
+            <a:r>
+              <a:rPr lang="pt-BR" dirty="0" err="1" smtClean="0"/>
+              <a:t>contactos</a:t>
+            </a:r>
+            <a:r>
+              <a:rPr lang="pt-BR" dirty="0" smtClean="0"/>
+              <a:t> </a:t>
+            </a:r>
+            <a:r>
+              <a:rPr lang="pt-BR" dirty="0" smtClean="0"/>
+              <a:t>é</a:t>
+            </a:r>
+            <a:r>
+              <a:rPr lang="pt-BR" baseline="0" dirty="0" smtClean="0"/>
+              <a:t> um atributo </a:t>
+            </a:r>
+            <a:r>
+              <a:rPr lang="pt-BR" baseline="0" dirty="0" err="1" smtClean="0"/>
+              <a:t>multi</a:t>
+            </a:r>
+            <a:r>
+              <a:rPr lang="pt-BR" baseline="0" dirty="0" smtClean="0"/>
+              <a:t>-valor, logo necessidade de nova tabela com multiplicidade ---</a:t>
+            </a:r>
+          </a:p>
+          <a:p>
+            <a:r>
+              <a:rPr lang="pt-BR" baseline="0" dirty="0" smtClean="0"/>
+              <a:t> </a:t>
+            </a:r>
+            <a:r>
+              <a:rPr lang="pt-BR" baseline="0" dirty="0" err="1" smtClean="0"/>
+              <a:t>f</a:t>
+            </a:r>
+            <a:r>
+              <a:rPr lang="pt-BR" baseline="0" dirty="0" smtClean="0"/>
+              <a:t> 1:N c.</a:t>
+            </a:r>
+          </a:p>
+          <a:p>
+            <a:r>
+              <a:rPr lang="pt-BR" baseline="0" dirty="0" smtClean="0"/>
+              <a:t>- chave primária composta por numero e id de funcionário, devido à possibilidade de um mesmo numero ser partilhado por mais que um funcionário. (numero de casa pai e filho)</a:t>
+            </a:r>
+            <a:endParaRPr lang="pt-BR" dirty="0"/>
+          </a:p>
+        </p:txBody>
+      </p:sp>
+      <p:sp>
+        <p:nvSpPr>
+          <p:cNvPr id="4" name="Espaço Reservado para Número de Slide 3"/>
+          <p:cNvSpPr>
+            <a:spLocks noGrp="1"/>
+          </p:cNvSpPr>
+          <p:nvPr>
+            <p:ph type="sldNum" sz="quarter" idx="10"/>
+          </p:nvPr>
+        </p:nvSpPr>
+        <p:spPr/>
+        <p:txBody>
+          <a:bodyPr/>
+          <a:lstStyle/>
+          <a:p>
+            <a:fld id="{18DD5218-A00C-7B4C-A0C7-9F9418E1D0E0}" type="slidenum">
+              <a:rPr lang="pt-BR" smtClean="0"/>
+              <a:t>14</a:t>
+            </a:fld>
+            <a:endParaRPr lang="pt-BR"/>
+          </a:p>
+        </p:txBody>
+      </p:sp>
+    </p:spTree>
+    <p:extLst>
+      <p:ext uri="{BB962C8B-B14F-4D97-AF65-F5344CB8AC3E}">
+        <p14:creationId xmlns:p14="http://schemas.microsoft.com/office/powerpoint/2010/main" val="1037127828"/>
+      </p:ext>
+    </p:extLst>
+  </p:cSld>
+  <p:clrMapOvr>
+    <a:masterClrMapping/>
+  </p:clrMapOvr>
+</p:notes>
 </file>
 
 <file path=ppt/slideLayouts/slideLayout1.xml><?xml version="1.0" encoding="utf-8"?>
@@ -640,7 +2776,7 @@
           <a:p>
             <a:fld id="{4505DA18-C5B8-044D-BC94-B6C93510AF8B}" type="datetimeFigureOut">
               <a:rPr lang="pt-BR" smtClean="0"/>
-              <a:t>24/01/2018</a:t>
+              <a:t>25/01/2018</a:t>
             </a:fld>
             <a:endParaRPr lang="pt-BR"/>
           </a:p>
@@ -941,7 +3077,7 @@
           <a:p>
             <a:fld id="{4505DA18-C5B8-044D-BC94-B6C93510AF8B}" type="datetimeFigureOut">
               <a:rPr lang="pt-BR" smtClean="0"/>
-              <a:t>24/01/2018</a:t>
+              <a:t>25/01/2018</a:t>
             </a:fld>
             <a:endParaRPr lang="pt-BR"/>
           </a:p>
@@ -1189,7 +3325,7 @@
           <a:p>
             <a:fld id="{4505DA18-C5B8-044D-BC94-B6C93510AF8B}" type="datetimeFigureOut">
               <a:rPr lang="pt-BR" smtClean="0"/>
-              <a:t>24/01/2018</a:t>
+              <a:t>25/01/2018</a:t>
             </a:fld>
             <a:endParaRPr lang="pt-BR"/>
           </a:p>
@@ -1729,7 +3865,7 @@
           <a:p>
             <a:fld id="{4505DA18-C5B8-044D-BC94-B6C93510AF8B}" type="datetimeFigureOut">
               <a:rPr lang="pt-BR" smtClean="0"/>
-              <a:t>24/01/2018</a:t>
+              <a:t>25/01/2018</a:t>
             </a:fld>
             <a:endParaRPr lang="pt-BR"/>
           </a:p>
@@ -1977,7 +4113,7 @@
           <a:p>
             <a:fld id="{4505DA18-C5B8-044D-BC94-B6C93510AF8B}" type="datetimeFigureOut">
               <a:rPr lang="pt-BR" smtClean="0"/>
-              <a:t>24/01/2018</a:t>
+              <a:t>25/01/2018</a:t>
             </a:fld>
             <a:endParaRPr lang="pt-BR"/>
           </a:p>
@@ -2509,7 +4645,7 @@
           <a:p>
             <a:fld id="{4505DA18-C5B8-044D-BC94-B6C93510AF8B}" type="datetimeFigureOut">
               <a:rPr lang="pt-BR" smtClean="0"/>
-              <a:t>24/01/2018</a:t>
+              <a:t>25/01/2018</a:t>
             </a:fld>
             <a:endParaRPr lang="pt-BR"/>
           </a:p>
@@ -2806,7 +4942,7 @@
           <a:p>
             <a:fld id="{4505DA18-C5B8-044D-BC94-B6C93510AF8B}" type="datetimeFigureOut">
               <a:rPr lang="pt-BR" smtClean="0"/>
-              <a:t>24/01/2018</a:t>
+              <a:t>25/01/2018</a:t>
             </a:fld>
             <a:endParaRPr lang="pt-BR"/>
           </a:p>
@@ -2980,7 +5116,7 @@
           <a:p>
             <a:fld id="{4505DA18-C5B8-044D-BC94-B6C93510AF8B}" type="datetimeFigureOut">
               <a:rPr lang="pt-BR" smtClean="0"/>
-              <a:t>24/01/2018</a:t>
+              <a:t>25/01/2018</a:t>
             </a:fld>
             <a:endParaRPr lang="pt-BR"/>
           </a:p>
@@ -3160,7 +5296,7 @@
           <a:p>
             <a:fld id="{4505DA18-C5B8-044D-BC94-B6C93510AF8B}" type="datetimeFigureOut">
               <a:rPr lang="pt-BR" smtClean="0"/>
-              <a:t>24/01/2018</a:t>
+              <a:t>25/01/2018</a:t>
             </a:fld>
             <a:endParaRPr lang="pt-BR"/>
           </a:p>
@@ -3335,7 +5471,7 @@
           <a:p>
             <a:fld id="{4505DA18-C5B8-044D-BC94-B6C93510AF8B}" type="datetimeFigureOut">
               <a:rPr lang="pt-BR" smtClean="0"/>
-              <a:t>24/01/2018</a:t>
+              <a:t>25/01/2018</a:t>
             </a:fld>
             <a:endParaRPr lang="pt-BR"/>
           </a:p>
@@ -3586,7 +5722,7 @@
           <a:p>
             <a:fld id="{4505DA18-C5B8-044D-BC94-B6C93510AF8B}" type="datetimeFigureOut">
               <a:rPr lang="pt-BR" smtClean="0"/>
-              <a:t>24/01/2018</a:t>
+              <a:t>25/01/2018</a:t>
             </a:fld>
             <a:endParaRPr lang="pt-BR"/>
           </a:p>
@@ -3888,7 +6024,7 @@
           <a:p>
             <a:fld id="{4505DA18-C5B8-044D-BC94-B6C93510AF8B}" type="datetimeFigureOut">
               <a:rPr lang="pt-BR" smtClean="0"/>
-              <a:t>24/01/2018</a:t>
+              <a:t>25/01/2018</a:t>
             </a:fld>
             <a:endParaRPr lang="pt-BR"/>
           </a:p>
@@ -4335,7 +6471,7 @@
           <a:p>
             <a:fld id="{4505DA18-C5B8-044D-BC94-B6C93510AF8B}" type="datetimeFigureOut">
               <a:rPr lang="pt-BR" smtClean="0"/>
-              <a:t>24/01/2018</a:t>
+              <a:t>25/01/2018</a:t>
             </a:fld>
             <a:endParaRPr lang="pt-BR"/>
           </a:p>
@@ -4458,7 +6594,7 @@
           <a:p>
             <a:fld id="{4505DA18-C5B8-044D-BC94-B6C93510AF8B}" type="datetimeFigureOut">
               <a:rPr lang="pt-BR" smtClean="0"/>
-              <a:t>24/01/2018</a:t>
+              <a:t>25/01/2018</a:t>
             </a:fld>
             <a:endParaRPr lang="pt-BR"/>
           </a:p>
@@ -4553,7 +6689,7 @@
           <a:p>
             <a:fld id="{4505DA18-C5B8-044D-BC94-B6C93510AF8B}" type="datetimeFigureOut">
               <a:rPr lang="pt-BR" smtClean="0"/>
-              <a:t>24/01/2018</a:t>
+              <a:t>25/01/2018</a:t>
             </a:fld>
             <a:endParaRPr lang="pt-BR"/>
           </a:p>
@@ -4841,7 +6977,7 @@
           <a:p>
             <a:fld id="{4505DA18-C5B8-044D-BC94-B6C93510AF8B}" type="datetimeFigureOut">
               <a:rPr lang="pt-BR" smtClean="0"/>
-              <a:t>24/01/2018</a:t>
+              <a:t>25/01/2018</a:t>
             </a:fld>
             <a:endParaRPr lang="pt-BR"/>
           </a:p>
@@ -5137,7 +7273,7 @@
           <a:p>
             <a:fld id="{4505DA18-C5B8-044D-BC94-B6C93510AF8B}" type="datetimeFigureOut">
               <a:rPr lang="pt-BR" smtClean="0"/>
-              <a:t>24/01/2018</a:t>
+              <a:t>25/01/2018</a:t>
             </a:fld>
             <a:endParaRPr lang="pt-BR"/>
           </a:p>
@@ -5667,7 +7803,7 @@
           <a:p>
             <a:fld id="{4505DA18-C5B8-044D-BC94-B6C93510AF8B}" type="datetimeFigureOut">
               <a:rPr lang="pt-BR" smtClean="0"/>
-              <a:t>24/01/2018</a:t>
+              <a:t>25/01/2018</a:t>
             </a:fld>
             <a:endParaRPr lang="pt-BR"/>
           </a:p>
@@ -6268,6 +8404,62 @@
           </a:p>
         </p:txBody>
       </p:sp>
+      <p:sp>
+        <p:nvSpPr>
+          <p:cNvPr id="4" name="CaixaDeTexto 3"/>
+          <p:cNvSpPr txBox="1"/>
+          <p:nvPr/>
+        </p:nvSpPr>
+        <p:spPr>
+          <a:xfrm>
+            <a:off x="6417276" y="5384801"/>
+            <a:ext cx="5085746" cy="1200329"/>
+          </a:xfrm>
+          <a:prstGeom prst="rect">
+            <a:avLst/>
+          </a:prstGeom>
+          <a:noFill/>
+        </p:spPr>
+        <p:txBody>
+          <a:bodyPr wrap="square" rtlCol="0">
+            <a:spAutoFit/>
+          </a:bodyPr>
+          <a:lstStyle/>
+          <a:p>
+            <a:pPr algn="r"/>
+            <a:r>
+              <a:rPr lang="pt-BR" dirty="0" smtClean="0"/>
+              <a:t>Francisco Lira a73909</a:t>
+            </a:r>
+          </a:p>
+          <a:p>
+            <a:pPr algn="r"/>
+            <a:r>
+              <a:rPr lang="pt-BR" dirty="0" smtClean="0"/>
+              <a:t>Francisco Costa a70922</a:t>
+            </a:r>
+          </a:p>
+          <a:p>
+            <a:pPr algn="r"/>
+            <a:r>
+              <a:rPr lang="pt-BR" dirty="0" smtClean="0"/>
+              <a:t>Tiago Alves a78218</a:t>
+            </a:r>
+          </a:p>
+          <a:p>
+            <a:pPr algn="r"/>
+            <a:r>
+              <a:rPr lang="pt-BR" dirty="0" smtClean="0"/>
+              <a:t>S</a:t>
+            </a:r>
+            <a:r>
+              <a:rPr lang="pt-BR" dirty="0" smtClean="0"/>
+              <a:t>érgio Costa a78296</a:t>
+            </a:r>
+            <a:endParaRPr lang="pt-BR" dirty="0"/>
+          </a:p>
+        </p:txBody>
+      </p:sp>
     </p:spTree>
     <p:extLst>
       <p:ext uri="{BB962C8B-B14F-4D97-AF65-F5344CB8AC3E}">
@@ -6354,7 +8546,7 @@
           </p:nvPr>
         </p:nvPicPr>
         <p:blipFill>
-          <a:blip r:embed="rId2">
+          <a:blip r:embed="rId3">
             <a:extLst>
               <a:ext uri="{28A0092B-C50C-407E-A947-70E740481C1C}">
                 <a14:useLocalDpi xmlns:a14="http://schemas.microsoft.com/office/drawing/2010/main" val="0"/>
@@ -6414,7 +8606,7 @@
           <p:nvPr/>
         </p:nvPicPr>
         <p:blipFill>
-          <a:blip r:embed="rId3">
+          <a:blip r:embed="rId4">
             <a:extLst>
               <a:ext uri="{28A0092B-C50C-407E-A947-70E740481C1C}">
                 <a14:useLocalDpi xmlns:a14="http://schemas.microsoft.com/office/drawing/2010/main" val="0"/>
@@ -6524,17 +8716,7 @@
           <a:p>
             <a:r>
               <a:rPr lang="pt-BR" dirty="0" smtClean="0"/>
-              <a:t>Conceptual </a:t>
-            </a:r>
-            <a:r>
-              <a:rPr lang="pt-BR" dirty="0" smtClean="0">
-                <a:sym typeface="Wingdings"/>
-              </a:rPr>
-              <a:t></a:t>
-            </a:r>
-            <a:r>
-              <a:rPr lang="pt-BR" dirty="0" smtClean="0"/>
-              <a:t> Lógico</a:t>
+              <a:t>Tabela Veículo</a:t>
             </a:r>
             <a:endParaRPr lang="pt-BR" dirty="0"/>
           </a:p>
@@ -6573,36 +8755,6 @@
           </a:fontRef>
         </p:style>
       </p:cxnSp>
-      <p:sp>
-        <p:nvSpPr>
-          <p:cNvPr id="11" name="CaixaDeTexto 10"/>
-          <p:cNvSpPr txBox="1"/>
-          <p:nvPr/>
-        </p:nvSpPr>
-        <p:spPr>
-          <a:xfrm>
-            <a:off x="5486180" y="1597337"/>
-            <a:ext cx="1723479" cy="369332"/>
-          </a:xfrm>
-          <a:prstGeom prst="rect">
-            <a:avLst/>
-          </a:prstGeom>
-          <a:noFill/>
-        </p:spPr>
-        <p:txBody>
-          <a:bodyPr wrap="square" rtlCol="0">
-            <a:spAutoFit/>
-          </a:bodyPr>
-          <a:lstStyle/>
-          <a:p>
-            <a:r>
-              <a:rPr lang="pt-BR" dirty="0" smtClean="0"/>
-              <a:t>Tabela Veículo</a:t>
-            </a:r>
-            <a:endParaRPr lang="pt-BR" dirty="0"/>
-          </a:p>
-        </p:txBody>
-      </p:sp>
       <p:pic>
         <p:nvPicPr>
           <p:cNvPr id="8" name="Espaço Reservado para Conteúdo 7"/>
@@ -6672,6 +8824,13 @@
   <p:clrMapOvr>
     <a:masterClrMapping/>
   </p:clrMapOvr>
+  <p:timing>
+    <p:tnLst>
+      <p:par>
+        <p:cTn id="1" dur="indefinite" restart="never" nodeType="tmRoot"/>
+      </p:par>
+    </p:tnLst>
+  </p:timing>
 </p:sld>
 </file>
 
@@ -6714,17 +8873,7 @@
           <a:p>
             <a:r>
               <a:rPr lang="pt-BR" dirty="0" smtClean="0"/>
-              <a:t>Conceptual </a:t>
-            </a:r>
-            <a:r>
-              <a:rPr lang="pt-BR" dirty="0" smtClean="0">
-                <a:sym typeface="Wingdings"/>
-              </a:rPr>
-              <a:t></a:t>
-            </a:r>
-            <a:r>
-              <a:rPr lang="pt-BR" dirty="0" smtClean="0"/>
-              <a:t> Lógico</a:t>
+              <a:t>Tabela Serviço</a:t>
             </a:r>
             <a:endParaRPr lang="pt-BR" dirty="0"/>
           </a:p>
@@ -6763,36 +8912,6 @@
           </a:fontRef>
         </p:style>
       </p:cxnSp>
-      <p:sp>
-        <p:nvSpPr>
-          <p:cNvPr id="11" name="CaixaDeTexto 10"/>
-          <p:cNvSpPr txBox="1"/>
-          <p:nvPr/>
-        </p:nvSpPr>
-        <p:spPr>
-          <a:xfrm>
-            <a:off x="5486180" y="1597337"/>
-            <a:ext cx="1723479" cy="369332"/>
-          </a:xfrm>
-          <a:prstGeom prst="rect">
-            <a:avLst/>
-          </a:prstGeom>
-          <a:noFill/>
-        </p:spPr>
-        <p:txBody>
-          <a:bodyPr wrap="square" rtlCol="0">
-            <a:spAutoFit/>
-          </a:bodyPr>
-          <a:lstStyle/>
-          <a:p>
-            <a:r>
-              <a:rPr lang="pt-BR" smtClean="0"/>
-              <a:t>Tabela Serviço</a:t>
-            </a:r>
-            <a:endParaRPr lang="pt-BR" dirty="0"/>
-          </a:p>
-        </p:txBody>
-      </p:sp>
       <p:pic>
         <p:nvPicPr>
           <p:cNvPr id="4" name="Espaço Reservado para Conteúdo 3"/>
@@ -6804,7 +8923,7 @@
           </p:nvPr>
         </p:nvPicPr>
         <p:blipFill>
-          <a:blip r:embed="rId2">
+          <a:blip r:embed="rId3">
             <a:extLst>
               <a:ext uri="{28A0092B-C50C-407E-A947-70E740481C1C}">
                 <a14:useLocalDpi xmlns:a14="http://schemas.microsoft.com/office/drawing/2010/main" val="0"/>
@@ -6831,7 +8950,7 @@
           <p:nvPr/>
         </p:nvPicPr>
         <p:blipFill>
-          <a:blip r:embed="rId3">
+          <a:blip r:embed="rId4">
             <a:extLst>
               <a:ext uri="{28A0092B-C50C-407E-A947-70E740481C1C}">
                 <a14:useLocalDpi xmlns:a14="http://schemas.microsoft.com/office/drawing/2010/main" val="0"/>
@@ -6862,6 +8981,13 @@
   <p:clrMapOvr>
     <a:masterClrMapping/>
   </p:clrMapOvr>
+  <p:timing>
+    <p:tnLst>
+      <p:par>
+        <p:cTn id="1" dur="indefinite" restart="never" nodeType="tmRoot"/>
+      </p:par>
+    </p:tnLst>
+  </p:timing>
 </p:sld>
 </file>
 
@@ -6904,17 +9030,7 @@
           <a:p>
             <a:r>
               <a:rPr lang="pt-BR" dirty="0" smtClean="0"/>
-              <a:t>Conceptual </a:t>
-            </a:r>
-            <a:r>
-              <a:rPr lang="pt-BR" dirty="0" smtClean="0">
-                <a:sym typeface="Wingdings"/>
-              </a:rPr>
-              <a:t></a:t>
-            </a:r>
-            <a:r>
-              <a:rPr lang="pt-BR" dirty="0" smtClean="0"/>
-              <a:t> Lógico</a:t>
+              <a:t>Tabela Peça</a:t>
             </a:r>
             <a:endParaRPr lang="pt-BR" dirty="0"/>
           </a:p>
@@ -6953,36 +9069,6 @@
           </a:fontRef>
         </p:style>
       </p:cxnSp>
-      <p:sp>
-        <p:nvSpPr>
-          <p:cNvPr id="11" name="CaixaDeTexto 10"/>
-          <p:cNvSpPr txBox="1"/>
-          <p:nvPr/>
-        </p:nvSpPr>
-        <p:spPr>
-          <a:xfrm>
-            <a:off x="5486180" y="1597337"/>
-            <a:ext cx="1723479" cy="369332"/>
-          </a:xfrm>
-          <a:prstGeom prst="rect">
-            <a:avLst/>
-          </a:prstGeom>
-          <a:noFill/>
-        </p:spPr>
-        <p:txBody>
-          <a:bodyPr wrap="square" rtlCol="0">
-            <a:spAutoFit/>
-          </a:bodyPr>
-          <a:lstStyle/>
-          <a:p>
-            <a:r>
-              <a:rPr lang="pt-BR" dirty="0" smtClean="0"/>
-              <a:t>Tabela Peça</a:t>
-            </a:r>
-            <a:endParaRPr lang="pt-BR" dirty="0"/>
-          </a:p>
-        </p:txBody>
-      </p:sp>
       <p:pic>
         <p:nvPicPr>
           <p:cNvPr id="6" name="Espaço Reservado para Conteúdo 5"/>
@@ -6994,7 +9080,7 @@
           </p:nvPr>
         </p:nvPicPr>
         <p:blipFill>
-          <a:blip r:embed="rId2">
+          <a:blip r:embed="rId3">
             <a:extLst>
               <a:ext uri="{28A0092B-C50C-407E-A947-70E740481C1C}">
                 <a14:useLocalDpi xmlns:a14="http://schemas.microsoft.com/office/drawing/2010/main" val="0"/>
@@ -7021,7 +9107,7 @@
           <p:nvPr/>
         </p:nvPicPr>
         <p:blipFill>
-          <a:blip r:embed="rId3">
+          <a:blip r:embed="rId4">
             <a:extLst>
               <a:ext uri="{28A0092B-C50C-407E-A947-70E740481C1C}">
                 <a14:useLocalDpi xmlns:a14="http://schemas.microsoft.com/office/drawing/2010/main" val="0"/>
@@ -7052,6 +9138,13 @@
   <p:clrMapOvr>
     <a:masterClrMapping/>
   </p:clrMapOvr>
+  <p:timing>
+    <p:tnLst>
+      <p:par>
+        <p:cTn id="1" dur="indefinite" restart="never" nodeType="tmRoot"/>
+      </p:par>
+    </p:tnLst>
+  </p:timing>
 </p:sld>
 </file>
 
@@ -7115,7 +9208,7 @@
           </p:nvPr>
         </p:nvPicPr>
         <p:blipFill>
-          <a:blip r:embed="rId2">
+          <a:blip r:embed="rId3">
             <a:extLst>
               <a:ext uri="{28A0092B-C50C-407E-A947-70E740481C1C}">
                 <a14:useLocalDpi xmlns:a14="http://schemas.microsoft.com/office/drawing/2010/main" val="0"/>
@@ -7143,6 +9236,13 @@
   <p:clrMapOvr>
     <a:masterClrMapping/>
   </p:clrMapOvr>
+  <p:timing>
+    <p:tnLst>
+      <p:par>
+        <p:cTn id="1" dur="indefinite" restart="never" nodeType="tmRoot"/>
+      </p:par>
+    </p:tnLst>
+  </p:timing>
 </p:sld>
 </file>
 
@@ -7206,7 +9306,7 @@
           </p:nvPr>
         </p:nvPicPr>
         <p:blipFill>
-          <a:blip r:embed="rId2">
+          <a:blip r:embed="rId3">
             <a:extLst>
               <a:ext uri="{28A0092B-C50C-407E-A947-70E740481C1C}">
                 <a14:useLocalDpi xmlns:a14="http://schemas.microsoft.com/office/drawing/2010/main" val="0"/>
@@ -7234,6 +9334,13 @@
   <p:clrMapOvr>
     <a:masterClrMapping/>
   </p:clrMapOvr>
+  <p:timing>
+    <p:tnLst>
+      <p:par>
+        <p:cTn id="1" dur="indefinite" restart="never" nodeType="tmRoot"/>
+      </p:par>
+    </p:tnLst>
+  </p:timing>
 </p:sld>
 </file>
 
@@ -7266,7 +9373,7 @@
         </p:nvSpPr>
         <p:spPr>
           <a:xfrm>
-            <a:off x="1484310" y="202324"/>
+            <a:off x="1484309" y="0"/>
             <a:ext cx="10018713" cy="1752599"/>
           </a:xfrm>
         </p:spPr>
@@ -7292,102 +9399,99 @@
             <p:ph idx="1"/>
           </p:nvPr>
         </p:nvSpPr>
-        <p:spPr/>
+        <p:spPr>
+          <a:xfrm>
+            <a:off x="1484309" y="1428509"/>
+            <a:ext cx="10018713" cy="2032322"/>
+          </a:xfrm>
+        </p:spPr>
         <p:txBody>
           <a:bodyPr/>
           <a:lstStyle/>
           <a:p>
             <a:r>
-              <a:rPr lang="pt-BR" b="1" dirty="0" smtClean="0"/>
+              <a:rPr lang="pt-BR" sz="1800" b="1" dirty="0" smtClean="0"/>
               <a:t>1ª Forma Normal </a:t>
             </a:r>
             <a:r>
-              <a:rPr lang="mr-IN" b="1" dirty="0" smtClean="0"/>
+              <a:rPr lang="mr-IN" sz="1800" b="1" dirty="0" smtClean="0"/>
               <a:t>–</a:t>
             </a:r>
             <a:r>
-              <a:rPr lang="pt-BR" b="1" dirty="0" smtClean="0"/>
+              <a:rPr lang="pt-BR" sz="1800" b="1" dirty="0" smtClean="0"/>
               <a:t> </a:t>
             </a:r>
             <a:r>
-              <a:rPr lang="pt-BR" dirty="0" smtClean="0"/>
-              <a:t>Quando os </a:t>
-            </a:r>
-            <a:r>
-              <a:rPr lang="pt-BR" dirty="0" smtClean="0"/>
-              <a:t>valores de todos os atributos são atómicos.</a:t>
+              <a:rPr lang="pt-BR" sz="1800" dirty="0" smtClean="0"/>
+              <a:t>Quando os valores de todos os atributos são atómicos.</a:t>
             </a:r>
           </a:p>
           <a:p>
             <a:pPr marL="285750" lvl="1"/>
             <a:r>
-              <a:rPr lang="pt-BR" sz="2400" b="1" dirty="0" smtClean="0"/>
+              <a:rPr lang="pt-BR" sz="1800" b="1" dirty="0" smtClean="0"/>
               <a:t>2ª Forma Normal </a:t>
             </a:r>
             <a:r>
-              <a:rPr lang="mr-IN" sz="2400" b="1" dirty="0" smtClean="0"/>
+              <a:rPr lang="mr-IN" sz="1800" b="1" dirty="0" smtClean="0"/>
               <a:t>–</a:t>
             </a:r>
             <a:r>
-              <a:rPr lang="pt-BR" sz="2400" b="1" dirty="0" smtClean="0"/>
+              <a:rPr lang="pt-BR" sz="1800" b="1" dirty="0" smtClean="0"/>
               <a:t> </a:t>
             </a:r>
             <a:r>
-              <a:rPr lang="pt-PT" sz="2400" dirty="0" smtClean="0"/>
-              <a:t>Quando t</a:t>
-            </a:r>
-            <a:r>
-              <a:rPr lang="pt-PT" sz="2400" dirty="0" smtClean="0"/>
-              <a:t>odos </a:t>
-            </a:r>
-            <a:r>
-              <a:rPr lang="pt-PT" sz="2400" dirty="0"/>
+              <a:rPr lang="pt-PT" sz="1800" dirty="0" smtClean="0"/>
+              <a:t>Quando todos </a:t>
+            </a:r>
+            <a:r>
+              <a:rPr lang="pt-PT" sz="1800" dirty="0"/>
               <a:t>os atributos </a:t>
             </a:r>
             <a:r>
-              <a:rPr lang="pt-PT" sz="2400" dirty="0" smtClean="0"/>
+              <a:rPr lang="pt-PT" sz="1800" dirty="0" smtClean="0"/>
               <a:t>não-chave dependem totalmente das </a:t>
             </a:r>
             <a:r>
-              <a:rPr lang="pt-PT" sz="2400" dirty="0"/>
+              <a:rPr lang="pt-PT" sz="1800" dirty="0"/>
               <a:t>chaves primárias</a:t>
             </a:r>
             <a:r>
-              <a:rPr lang="pt-PT" sz="2400" dirty="0" smtClean="0"/>
+              <a:rPr lang="pt-PT" sz="1800" dirty="0" smtClean="0"/>
               <a:t>.</a:t>
             </a:r>
           </a:p>
           <a:p>
             <a:pPr marL="285750" lvl="1"/>
             <a:r>
-              <a:rPr lang="pt-PT" sz="2400" b="1" dirty="0" smtClean="0"/>
+              <a:rPr lang="pt-PT" sz="1800" b="1" dirty="0" smtClean="0"/>
               <a:t>3ª Forma Normal </a:t>
             </a:r>
             <a:r>
-              <a:rPr lang="mr-IN" sz="2400" b="1" dirty="0" smtClean="0"/>
+              <a:rPr lang="mr-IN" sz="1800" b="1" dirty="0" smtClean="0"/>
               <a:t>–</a:t>
             </a:r>
             <a:r>
-              <a:rPr lang="pt-PT" sz="2400" b="1" dirty="0" smtClean="0"/>
+              <a:rPr lang="pt-PT" sz="1800" b="1" dirty="0" smtClean="0"/>
               <a:t> </a:t>
             </a:r>
             <a:r>
-              <a:rPr lang="pt-PT" sz="2400" dirty="0" smtClean="0"/>
+              <a:rPr lang="pt-PT" sz="1800" dirty="0" smtClean="0"/>
               <a:t>Quando nenhum </a:t>
             </a:r>
             <a:r>
-              <a:rPr lang="pt-PT" sz="2400" dirty="0"/>
+              <a:rPr lang="pt-PT" sz="1800" dirty="0"/>
               <a:t>atributo não-chave </a:t>
             </a:r>
             <a:r>
-              <a:rPr lang="pt-PT" sz="2400" dirty="0" smtClean="0"/>
+              <a:rPr lang="pt-PT" sz="1800" dirty="0" smtClean="0"/>
               <a:t>depende </a:t>
             </a:r>
             <a:r>
-              <a:rPr lang="pt-PT" sz="2400" dirty="0"/>
+              <a:rPr lang="pt-PT" sz="1800" dirty="0"/>
               <a:t>transitivamente da chave primária.</a:t>
             </a:r>
-            <a:endParaRPr lang="en-US" sz="2400" dirty="0"/>
+            <a:endParaRPr lang="en-US" sz="1800" dirty="0"/>
           </a:p>
           <a:p>
             <a:pPr marL="285750" lvl="1"/>
@@ -7395,6 +9499,47 @@
           </a:p>
         </p:txBody>
       </p:sp>
+      <p:pic>
+        <p:nvPicPr>
+          <p:cNvPr id="4" name="Picture 2" descr="https://lh5.googleusercontent.com/RgK5g29KDVrEE4tir2EvE-gpP9Wv5Fwr4EwEluHABVpoD7N20eI9_uCOwQn-x6vYRkMaFpQvP8j5a-2bs7LEsKwp4unxo5ow-72jn7MyZov1TyMvOexPJYUFVOgnlGiT27qvFVsa"/>
+          <p:cNvPicPr>
+            <a:picLocks noChangeAspect="1" noChangeArrowheads="1"/>
+          </p:cNvPicPr>
+          <p:nvPr/>
+        </p:nvPicPr>
+        <p:blipFill>
+          <a:blip r:embed="rId3">
+            <a:extLst>
+              <a:ext uri="{28A0092B-C50C-407E-A947-70E740481C1C}">
+                <a14:useLocalDpi xmlns:a14="http://schemas.microsoft.com/office/drawing/2010/main" val="0"/>
+              </a:ext>
+            </a:extLst>
+          </a:blip>
+          <a:srcRect/>
+          <a:stretch>
+            <a:fillRect/>
+          </a:stretch>
+        </p:blipFill>
+        <p:spPr bwMode="auto">
+          <a:xfrm>
+            <a:off x="3032568" y="3181108"/>
+            <a:ext cx="6921928" cy="3309814"/>
+          </a:xfrm>
+          <a:prstGeom prst="rect">
+            <a:avLst/>
+          </a:prstGeom>
+          <a:noFill/>
+          <a:extLst>
+            <a:ext uri="{909E8E84-426E-40DD-AFC4-6F175D3DCCD1}">
+              <a14:hiddenFill xmlns:a14="http://schemas.microsoft.com/office/drawing/2010/main">
+                <a:solidFill>
+                  <a:srgbClr val="FFFFFF"/>
+                </a:solidFill>
+              </a14:hiddenFill>
+            </a:ext>
+          </a:extLst>
+        </p:spPr>
+      </p:pic>
     </p:spTree>
     <p:extLst>
       <p:ext uri="{BB962C8B-B14F-4D97-AF65-F5344CB8AC3E}">
@@ -7405,6 +9550,13 @@
   <p:clrMapOvr>
     <a:masterClrMapping/>
   </p:clrMapOvr>
+  <p:timing>
+    <p:tnLst>
+      <p:par>
+        <p:cTn id="1" dur="indefinite" restart="never" nodeType="tmRoot"/>
+      </p:par>
+    </p:tnLst>
+  </p:timing>
 </p:sld>
 </file>
 
@@ -7472,6 +9624,13 @@
   <p:clrMapOvr>
     <a:masterClrMapping/>
   </p:clrMapOvr>
+  <p:timing>
+    <p:tnLst>
+      <p:par>
+        <p:cTn id="1" dur="indefinite" restart="never" nodeType="tmRoot"/>
+      </p:par>
+    </p:tnLst>
+  </p:timing>
 </p:sld>
 </file>
 
@@ -7585,6 +9744,13 @@
   <p:clrMapOvr>
     <a:masterClrMapping/>
   </p:clrMapOvr>
+  <p:timing>
+    <p:tnLst>
+      <p:par>
+        <p:cTn id="1" dur="indefinite" restart="never" nodeType="tmRoot"/>
+      </p:par>
+    </p:tnLst>
+  </p:timing>
 </p:sld>
 </file>
 
@@ -7698,6 +9864,13 @@
   <p:clrMapOvr>
     <a:masterClrMapping/>
   </p:clrMapOvr>
+  <p:timing>
+    <p:tnLst>
+      <p:par>
+        <p:cTn id="1" dur="indefinite" restart="never" nodeType="tmRoot"/>
+      </p:par>
+    </p:tnLst>
+  </p:timing>
 </p:sld>
 </file>
 
@@ -7730,36 +9903,68 @@
         </p:nvSpPr>
         <p:spPr>
           <a:xfrm>
-            <a:off x="1765235" y="2192779"/>
-            <a:ext cx="8911687" cy="1280890"/>
+            <a:off x="1484312" y="268014"/>
+            <a:ext cx="10018713" cy="1752599"/>
           </a:xfrm>
         </p:spPr>
         <p:txBody>
-          <a:bodyPr>
-            <a:noAutofit/>
-          </a:bodyPr>
+          <a:bodyPr/>
           <a:lstStyle/>
           <a:p>
-            <a:pPr algn="ctr"/>
-            <a:r>
-              <a:rPr lang="pt-BR" sz="9600" dirty="0" smtClean="0"/>
-              <a:t>Modelo </a:t>
-            </a:r>
-            <a:br>
-              <a:rPr lang="pt-BR" sz="9600" dirty="0" smtClean="0"/>
-            </a:br>
-            <a:r>
-              <a:rPr lang="pt-BR" sz="9600" dirty="0" smtClean="0"/>
-              <a:t>Relacional</a:t>
-            </a:r>
-            <a:endParaRPr lang="pt-BR" sz="9600" dirty="0"/>
-          </a:p>
-        </p:txBody>
-      </p:sp>
+            <a:r>
+              <a:rPr lang="pt-BR" dirty="0" smtClean="0"/>
+              <a:t>Caso de estudo</a:t>
+            </a:r>
+            <a:endParaRPr lang="pt-BR" dirty="0"/>
+          </a:p>
+        </p:txBody>
+      </p:sp>
+      <p:pic>
+        <p:nvPicPr>
+          <p:cNvPr id="6" name="Espaço Reservado para Conteúdo 5"/>
+          <p:cNvPicPr>
+            <a:picLocks noGrp="1" noChangeAspect="1"/>
+          </p:cNvPicPr>
+          <p:nvPr>
+            <p:ph idx="1"/>
+          </p:nvPr>
+        </p:nvPicPr>
+        <p:blipFill>
+          <a:blip r:embed="rId3">
+            <a:extLst>
+              <a:ext uri="{28A0092B-C50C-407E-A947-70E740481C1C}">
+                <a14:useLocalDpi xmlns:a14="http://schemas.microsoft.com/office/drawing/2010/main" val="0"/>
+              </a:ext>
+            </a:extLst>
+          </a:blip>
+          <a:stretch>
+            <a:fillRect/>
+          </a:stretch>
+        </p:blipFill>
+        <p:spPr>
+          <a:xfrm>
+            <a:off x="3652360" y="1933904"/>
+            <a:ext cx="5682616" cy="3124200"/>
+          </a:xfrm>
+          <a:prstGeom prst="rect">
+            <a:avLst/>
+          </a:prstGeom>
+          <a:ln>
+            <a:noFill/>
+          </a:ln>
+          <a:effectLst>
+            <a:outerShdw blurRad="190500" algn="tl" rotWithShape="0">
+              <a:srgbClr val="000000">
+                <a:alpha val="70000"/>
+              </a:srgbClr>
+            </a:outerShdw>
+          </a:effectLst>
+        </p:spPr>
+      </p:pic>
     </p:spTree>
     <p:extLst>
       <p:ext uri="{BB962C8B-B14F-4D97-AF65-F5344CB8AC3E}">
-        <p14:creationId xmlns:p14="http://schemas.microsoft.com/office/powerpoint/2010/main" val="1255387090"/>
+        <p14:creationId xmlns:p14="http://schemas.microsoft.com/office/powerpoint/2010/main" val="714880226"/>
       </p:ext>
     </p:extLst>
   </p:cSld>
@@ -7890,6 +10095,13 @@
   <p:clrMapOvr>
     <a:masterClrMapping/>
   </p:clrMapOvr>
+  <p:timing>
+    <p:tnLst>
+      <p:par>
+        <p:cTn id="1" dur="indefinite" restart="never" nodeType="tmRoot"/>
+      </p:par>
+    </p:tnLst>
+  </p:timing>
 </p:sld>
 </file>
 
@@ -8014,81 +10226,6 @@
             <p:ph type="title"/>
           </p:nvPr>
         </p:nvSpPr>
-        <p:spPr>
-          <a:xfrm>
-            <a:off x="1663263" y="1767110"/>
-            <a:ext cx="9309538" cy="2032380"/>
-          </a:xfrm>
-        </p:spPr>
-        <p:txBody>
-          <a:bodyPr>
-            <a:noAutofit/>
-          </a:bodyPr>
-          <a:lstStyle/>
-          <a:p>
-            <a:pPr algn="ctr"/>
-            <a:r>
-              <a:rPr lang="pt-BR" sz="6000" dirty="0" smtClean="0"/>
-              <a:t>Modelo Não Relacional</a:t>
-            </a:r>
-            <a:br>
-              <a:rPr lang="pt-BR" sz="6000" dirty="0" smtClean="0"/>
-            </a:br>
-            <a:r>
-              <a:rPr lang="pt-BR" sz="6000" u="sng" dirty="0" smtClean="0"/>
-              <a:t>Neo4j</a:t>
-            </a:r>
-            <a:endParaRPr lang="pt-BR" sz="6000" u="sng" dirty="0"/>
-          </a:p>
-        </p:txBody>
-      </p:sp>
-    </p:spTree>
-    <p:extLst>
-      <p:ext uri="{BB962C8B-B14F-4D97-AF65-F5344CB8AC3E}">
-        <p14:creationId xmlns:p14="http://schemas.microsoft.com/office/powerpoint/2010/main" val="1880346039"/>
-      </p:ext>
-    </p:extLst>
-  </p:cSld>
-  <p:clrMapOvr>
-    <a:masterClrMapping/>
-  </p:clrMapOvr>
-  <p:timing>
-    <p:tnLst>
-      <p:par>
-        <p:cTn id="1" dur="indefinite" restart="never" nodeType="tmRoot"/>
-      </p:par>
-    </p:tnLst>
-  </p:timing>
-</p:sld>
-</file>
-
-<file path=ppt/slides/slide23.xml><?xml version="1.0" encoding="utf-8"?>
-<p:sld xmlns:a="http://schemas.openxmlformats.org/drawingml/2006/main" xmlns:r="http://schemas.openxmlformats.org/officeDocument/2006/relationships" xmlns:p="http://schemas.openxmlformats.org/presentationml/2006/main">
-  <p:cSld>
-    <p:spTree>
-      <p:nvGrpSpPr>
-        <p:cNvPr id="1" name=""/>
-        <p:cNvGrpSpPr/>
-        <p:nvPr/>
-      </p:nvGrpSpPr>
-      <p:grpSpPr>
-        <a:xfrm>
-          <a:off x="0" y="0"/>
-          <a:ext cx="0" cy="0"/>
-          <a:chOff x="0" y="0"/>
-          <a:chExt cx="0" cy="0"/>
-        </a:xfrm>
-      </p:grpSpPr>
-      <p:sp>
-        <p:nvSpPr>
-          <p:cNvPr id="2" name="Título 1"/>
-          <p:cNvSpPr>
-            <a:spLocks noGrp="1"/>
-          </p:cNvSpPr>
-          <p:nvPr>
-            <p:ph type="title"/>
-          </p:nvPr>
-        </p:nvSpPr>
         <p:spPr/>
         <p:txBody>
           <a:bodyPr/>
@@ -8096,7 +10233,11 @@
           <a:p>
             <a:r>
               <a:rPr lang="pt-BR" dirty="0" smtClean="0"/>
-              <a:t>Contextualização</a:t>
+              <a:t>Evoluç</a:t>
+            </a:r>
+            <a:r>
+              <a:rPr lang="pt-BR" dirty="0" smtClean="0"/>
+              <a:t>ão</a:t>
             </a:r>
             <a:endParaRPr lang="pt-BR" dirty="0"/>
           </a:p>
@@ -8113,7 +10254,7 @@
           </p:nvPr>
         </p:nvPicPr>
         <p:blipFill>
-          <a:blip r:embed="rId2">
+          <a:blip r:embed="rId3">
             <a:extLst>
               <a:ext uri="{28A0092B-C50C-407E-A947-70E740481C1C}">
                 <a14:useLocalDpi xmlns:a14="http://schemas.microsoft.com/office/drawing/2010/main" val="0"/>
@@ -8154,6 +10295,88 @@
   <p:clrMapOvr>
     <a:masterClrMapping/>
   </p:clrMapOvr>
+  <p:timing>
+    <p:tnLst>
+      <p:par>
+        <p:cTn id="1" dur="indefinite" restart="never" nodeType="tmRoot"/>
+      </p:par>
+    </p:tnLst>
+  </p:timing>
+</p:sld>
+</file>
+
+<file path=ppt/slides/slide23.xml><?xml version="1.0" encoding="utf-8"?>
+<p:sld xmlns:a="http://schemas.openxmlformats.org/drawingml/2006/main" xmlns:r="http://schemas.openxmlformats.org/officeDocument/2006/relationships" xmlns:p="http://schemas.openxmlformats.org/presentationml/2006/main">
+  <p:cSld>
+    <p:spTree>
+      <p:nvGrpSpPr>
+        <p:cNvPr id="1" name=""/>
+        <p:cNvGrpSpPr/>
+        <p:nvPr/>
+      </p:nvGrpSpPr>
+      <p:grpSpPr>
+        <a:xfrm>
+          <a:off x="0" y="0"/>
+          <a:ext cx="0" cy="0"/>
+          <a:chOff x="0" y="0"/>
+          <a:chExt cx="0" cy="0"/>
+        </a:xfrm>
+      </p:grpSpPr>
+      <p:sp>
+        <p:nvSpPr>
+          <p:cNvPr id="2" name="Título 1"/>
+          <p:cNvSpPr>
+            <a:spLocks noGrp="1"/>
+          </p:cNvSpPr>
+          <p:nvPr>
+            <p:ph type="title"/>
+          </p:nvPr>
+        </p:nvSpPr>
+        <p:spPr>
+          <a:xfrm>
+            <a:off x="1663263" y="1767110"/>
+            <a:ext cx="9309538" cy="2032380"/>
+          </a:xfrm>
+        </p:spPr>
+        <p:txBody>
+          <a:bodyPr>
+            <a:noAutofit/>
+          </a:bodyPr>
+          <a:lstStyle/>
+          <a:p>
+            <a:pPr algn="ctr"/>
+            <a:r>
+              <a:rPr lang="pt-BR" sz="6000" dirty="0" smtClean="0"/>
+              <a:t>Modelo Não Relacional</a:t>
+            </a:r>
+            <a:br>
+              <a:rPr lang="pt-BR" sz="6000" dirty="0" smtClean="0"/>
+            </a:br>
+            <a:r>
+              <a:rPr lang="pt-BR" sz="6000" u="sng" dirty="0" smtClean="0"/>
+              <a:t>Neo4j</a:t>
+            </a:r>
+            <a:endParaRPr lang="pt-BR" sz="6000" u="sng" dirty="0"/>
+          </a:p>
+        </p:txBody>
+      </p:sp>
+    </p:spTree>
+    <p:extLst>
+      <p:ext uri="{BB962C8B-B14F-4D97-AF65-F5344CB8AC3E}">
+        <p14:creationId xmlns:p14="http://schemas.microsoft.com/office/powerpoint/2010/main" val="1880346039"/>
+      </p:ext>
+    </p:extLst>
+  </p:cSld>
+  <p:clrMapOvr>
+    <a:masterClrMapping/>
+  </p:clrMapOvr>
+  <p:timing>
+    <p:tnLst>
+      <p:par>
+        <p:cTn id="1" dur="indefinite" restart="never" nodeType="tmRoot"/>
+      </p:par>
+    </p:tnLst>
+  </p:timing>
 </p:sld>
 </file>
 
@@ -8250,6 +10473,13 @@
   <p:clrMapOvr>
     <a:masterClrMapping/>
   </p:clrMapOvr>
+  <p:timing>
+    <p:tnLst>
+      <p:par>
+        <p:cTn id="1" dur="indefinite" restart="never" nodeType="tmRoot"/>
+      </p:par>
+    </p:tnLst>
+  </p:timing>
 </p:sld>
 </file>
 
@@ -8337,6 +10567,13 @@
   <p:clrMapOvr>
     <a:masterClrMapping/>
   </p:clrMapOvr>
+  <p:timing>
+    <p:tnLst>
+      <p:par>
+        <p:cTn id="1" dur="indefinite" restart="never" nodeType="tmRoot"/>
+      </p:par>
+    </p:tnLst>
+  </p:timing>
 </p:sld>
 </file>
 
@@ -8396,7 +10633,7 @@
           </p:nvPr>
         </p:nvPicPr>
         <p:blipFill>
-          <a:blip r:embed="rId2">
+          <a:blip r:embed="rId3">
             <a:extLst>
               <a:ext uri="{28A0092B-C50C-407E-A947-70E740481C1C}">
                 <a14:useLocalDpi xmlns:a14="http://schemas.microsoft.com/office/drawing/2010/main" val="0"/>
@@ -8423,7 +10660,7 @@
           <p:nvPr/>
         </p:nvPicPr>
         <p:blipFill>
-          <a:blip r:embed="rId3">
+          <a:blip r:embed="rId4">
             <a:extLst>
               <a:ext uri="{28A0092B-C50C-407E-A947-70E740481C1C}">
                 <a14:useLocalDpi xmlns:a14="http://schemas.microsoft.com/office/drawing/2010/main" val="0"/>
@@ -8453,7 +10690,7 @@
           <p:nvPr/>
         </p:nvPicPr>
         <p:blipFill>
-          <a:blip r:embed="rId4">
+          <a:blip r:embed="rId5">
             <a:extLst>
               <a:ext uri="{28A0092B-C50C-407E-A947-70E740481C1C}">
                 <a14:useLocalDpi xmlns:a14="http://schemas.microsoft.com/office/drawing/2010/main" val="0"/>
@@ -8483,7 +10720,7 @@
           <p:nvPr/>
         </p:nvPicPr>
         <p:blipFill>
-          <a:blip r:embed="rId5">
+          <a:blip r:embed="rId6">
             <a:extLst>
               <a:ext uri="{28A0092B-C50C-407E-A947-70E740481C1C}">
                 <a14:useLocalDpi xmlns:a14="http://schemas.microsoft.com/office/drawing/2010/main" val="0"/>
@@ -8613,78 +10850,13 @@
   <p:clrMapOvr>
     <a:masterClrMapping/>
   </p:clrMapOvr>
-</p:sld>
-</file>
-
-<file path=ppt/slides/slide27.xml><?xml version="1.0" encoding="utf-8"?>
-<p:sld xmlns:a="http://schemas.openxmlformats.org/drawingml/2006/main" xmlns:r="http://schemas.openxmlformats.org/officeDocument/2006/relationships" xmlns:p="http://schemas.openxmlformats.org/presentationml/2006/main">
-  <p:cSld>
-    <p:spTree>
-      <p:nvGrpSpPr>
-        <p:cNvPr id="1" name=""/>
-        <p:cNvGrpSpPr/>
-        <p:nvPr/>
-      </p:nvGrpSpPr>
-      <p:grpSpPr>
-        <a:xfrm>
-          <a:off x="0" y="0"/>
-          <a:ext cx="0" cy="0"/>
-          <a:chOff x="0" y="0"/>
-          <a:chExt cx="0" cy="0"/>
-        </a:xfrm>
-      </p:grpSpPr>
-      <p:sp>
-        <p:nvSpPr>
-          <p:cNvPr id="2" name="Título 1"/>
-          <p:cNvSpPr>
-            <a:spLocks noGrp="1"/>
-          </p:cNvSpPr>
-          <p:nvPr>
-            <p:ph type="title"/>
-          </p:nvPr>
-        </p:nvSpPr>
-        <p:spPr/>
-        <p:txBody>
-          <a:bodyPr/>
-          <a:lstStyle/>
-          <a:p>
-            <a:r>
-              <a:rPr lang="pt-BR" dirty="0" smtClean="0"/>
-              <a:t>Conclusões</a:t>
-            </a:r>
-            <a:endParaRPr lang="pt-BR" dirty="0"/>
-          </a:p>
-        </p:txBody>
-      </p:sp>
-      <p:sp>
-        <p:nvSpPr>
-          <p:cNvPr id="3" name="Espaço Reservado para Conteúdo 2"/>
-          <p:cNvSpPr>
-            <a:spLocks noGrp="1"/>
-          </p:cNvSpPr>
-          <p:nvPr>
-            <p:ph idx="1"/>
-          </p:nvPr>
-        </p:nvSpPr>
-        <p:spPr/>
-        <p:txBody>
-          <a:bodyPr/>
-          <a:lstStyle/>
-          <a:p>
-            <a:endParaRPr lang="pt-BR"/>
-          </a:p>
-        </p:txBody>
-      </p:sp>
-    </p:spTree>
-    <p:extLst>
-      <p:ext uri="{BB962C8B-B14F-4D97-AF65-F5344CB8AC3E}">
-        <p14:creationId xmlns:p14="http://schemas.microsoft.com/office/powerpoint/2010/main" val="717293418"/>
-      </p:ext>
-    </p:extLst>
-  </p:cSld>
-  <p:clrMapOvr>
-    <a:masterClrMapping/>
-  </p:clrMapOvr>
+  <p:timing>
+    <p:tnLst>
+      <p:par>
+        <p:cTn id="1" dur="indefinite" restart="never" nodeType="tmRoot"/>
+      </p:par>
+    </p:tnLst>
+  </p:timing>
 </p:sld>
 </file>
 
@@ -8717,68 +10889,36 @@
         </p:nvSpPr>
         <p:spPr>
           <a:xfrm>
-            <a:off x="1484312" y="268014"/>
-            <a:ext cx="10018713" cy="1752599"/>
+            <a:off x="1765235" y="2192779"/>
+            <a:ext cx="8911687" cy="1280890"/>
           </a:xfrm>
         </p:spPr>
         <p:txBody>
-          <a:bodyPr/>
+          <a:bodyPr>
+            <a:noAutofit/>
+          </a:bodyPr>
           <a:lstStyle/>
           <a:p>
-            <a:r>
-              <a:rPr lang="pt-BR" dirty="0" smtClean="0"/>
-              <a:t>Caso de estudo</a:t>
-            </a:r>
-            <a:endParaRPr lang="pt-BR" dirty="0"/>
-          </a:p>
-        </p:txBody>
-      </p:sp>
-      <p:pic>
-        <p:nvPicPr>
-          <p:cNvPr id="6" name="Espaço Reservado para Conteúdo 5"/>
-          <p:cNvPicPr>
-            <a:picLocks noGrp="1" noChangeAspect="1"/>
-          </p:cNvPicPr>
-          <p:nvPr>
-            <p:ph idx="1"/>
-          </p:nvPr>
-        </p:nvPicPr>
-        <p:blipFill>
-          <a:blip r:embed="rId2">
-            <a:extLst>
-              <a:ext uri="{28A0092B-C50C-407E-A947-70E740481C1C}">
-                <a14:useLocalDpi xmlns:a14="http://schemas.microsoft.com/office/drawing/2010/main" val="0"/>
-              </a:ext>
-            </a:extLst>
-          </a:blip>
-          <a:stretch>
-            <a:fillRect/>
-          </a:stretch>
-        </p:blipFill>
-        <p:spPr>
-          <a:xfrm>
-            <a:off x="3652360" y="1933904"/>
-            <a:ext cx="5682616" cy="3124200"/>
-          </a:xfrm>
-          <a:prstGeom prst="rect">
-            <a:avLst/>
-          </a:prstGeom>
-          <a:ln>
-            <a:noFill/>
-          </a:ln>
-          <a:effectLst>
-            <a:outerShdw blurRad="190500" algn="tl" rotWithShape="0">
-              <a:srgbClr val="000000">
-                <a:alpha val="70000"/>
-              </a:srgbClr>
-            </a:outerShdw>
-          </a:effectLst>
-        </p:spPr>
-      </p:pic>
+            <a:pPr algn="ctr"/>
+            <a:r>
+              <a:rPr lang="pt-BR" sz="9600" dirty="0" smtClean="0"/>
+              <a:t>Modelo </a:t>
+            </a:r>
+            <a:br>
+              <a:rPr lang="pt-BR" sz="9600" dirty="0" smtClean="0"/>
+            </a:br>
+            <a:r>
+              <a:rPr lang="pt-BR" sz="9600" dirty="0" smtClean="0"/>
+              <a:t>Relacional</a:t>
+            </a:r>
+            <a:endParaRPr lang="pt-BR" sz="9600" dirty="0"/>
+          </a:p>
+        </p:txBody>
+      </p:sp>
     </p:spTree>
     <p:extLst>
       <p:ext uri="{BB962C8B-B14F-4D97-AF65-F5344CB8AC3E}">
-        <p14:creationId xmlns:p14="http://schemas.microsoft.com/office/powerpoint/2010/main" val="714880226"/>
+        <p14:creationId xmlns:p14="http://schemas.microsoft.com/office/powerpoint/2010/main" val="1255387090"/>
       </p:ext>
     </p:extLst>
   </p:cSld>
@@ -9068,7 +11208,7 @@
           </p:nvPr>
         </p:nvPicPr>
         <p:blipFill>
-          <a:blip r:embed="rId2">
+          <a:blip r:embed="rId3">
             <a:extLst>
               <a:ext uri="{28A0092B-C50C-407E-A947-70E740481C1C}">
                 <a14:useLocalDpi xmlns:a14="http://schemas.microsoft.com/office/drawing/2010/main" val="0"/>
@@ -14206,4 +16346,265 @@
     </a:ext>
   </a:extLst>
 </a:theme>
+</file>
+
+<file path=ppt/theme/theme2.xml><?xml version="1.0" encoding="utf-8"?>
+<a:theme xmlns:a="http://schemas.openxmlformats.org/drawingml/2006/main" name="Tema do Office">
+  <a:themeElements>
+    <a:clrScheme name="Office">
+      <a:dk1>
+        <a:sysClr val="windowText" lastClr="000000"/>
+      </a:dk1>
+      <a:lt1>
+        <a:sysClr val="window" lastClr="FFFFFF"/>
+      </a:lt1>
+      <a:dk2>
+        <a:srgbClr val="44546A"/>
+      </a:dk2>
+      <a:lt2>
+        <a:srgbClr val="E7E6E6"/>
+      </a:lt2>
+      <a:accent1>
+        <a:srgbClr val="5B9BD5"/>
+      </a:accent1>
+      <a:accent2>
+        <a:srgbClr val="ED7D31"/>
+      </a:accent2>
+      <a:accent3>
+        <a:srgbClr val="A5A5A5"/>
+      </a:accent3>
+      <a:accent4>
+        <a:srgbClr val="FFC000"/>
+      </a:accent4>
+      <a:accent5>
+        <a:srgbClr val="4472C4"/>
+      </a:accent5>
+      <a:accent6>
+        <a:srgbClr val="70AD47"/>
+      </a:accent6>
+      <a:hlink>
+        <a:srgbClr val="0563C1"/>
+      </a:hlink>
+      <a:folHlink>
+        <a:srgbClr val="954F72"/>
+      </a:folHlink>
+    </a:clrScheme>
+    <a:fontScheme name="Office">
+      <a:majorFont>
+        <a:latin typeface="Calibri Light" panose="020F0302020204030204"/>
+        <a:ea typeface=""/>
+        <a:cs typeface=""/>
+        <a:font script="Jpan" typeface="ＭＳ Ｐゴシック"/>
+        <a:font script="Hang" typeface="맑은 고딕"/>
+        <a:font script="Hans" typeface="宋体"/>
+        <a:font script="Hant" typeface="新細明體"/>
+        <a:font script="Arab" typeface="Times New Roman"/>
+        <a:font script="Hebr" typeface="Times New Roman"/>
+        <a:font script="Thai" typeface="Angsana New"/>
+        <a:font script="Ethi" typeface="Nyala"/>
+        <a:font script="Beng" typeface="Vrinda"/>
+        <a:font script="Gujr" typeface="Shruti"/>
+        <a:font script="Khmr" typeface="MoolBoran"/>
+        <a:font script="Knda" typeface="Tunga"/>
+        <a:font script="Guru" typeface="Raavi"/>
+        <a:font script="Cans" typeface="Euphemia"/>
+        <a:font script="Cher" typeface="Plantagenet Cherokee"/>
+        <a:font script="Yiii" typeface="Microsoft Yi Baiti"/>
+        <a:font script="Tibt" typeface="Microsoft Himalaya"/>
+        <a:font script="Thaa" typeface="MV Boli"/>
+        <a:font script="Deva" typeface="Mangal"/>
+        <a:font script="Telu" typeface="Gautami"/>
+        <a:font script="Taml" typeface="Latha"/>
+        <a:font script="Syrc" typeface="Estrangelo Edessa"/>
+        <a:font script="Orya" typeface="Kalinga"/>
+        <a:font script="Mlym" typeface="Kartika"/>
+        <a:font script="Laoo" typeface="DokChampa"/>
+        <a:font script="Sinh" typeface="Iskoola Pota"/>
+        <a:font script="Mong" typeface="Mongolian Baiti"/>
+        <a:font script="Viet" typeface="Times New Roman"/>
+        <a:font script="Uigh" typeface="Microsoft Uighur"/>
+        <a:font script="Geor" typeface="Sylfaen"/>
+      </a:majorFont>
+      <a:minorFont>
+        <a:latin typeface="Calibri" panose="020F0502020204030204"/>
+        <a:ea typeface=""/>
+        <a:cs typeface=""/>
+        <a:font script="Jpan" typeface="ＭＳ Ｐゴシック"/>
+        <a:font script="Hang" typeface="맑은 고딕"/>
+        <a:font script="Hans" typeface="宋体"/>
+        <a:font script="Hant" typeface="新細明體"/>
+        <a:font script="Arab" typeface="Arial"/>
+        <a:font script="Hebr" typeface="Arial"/>
+        <a:font script="Thai" typeface="Cordia New"/>
+        <a:font script="Ethi" typeface="Nyala"/>
+        <a:font script="Beng" typeface="Vrinda"/>
+        <a:font script="Gujr" typeface="Shruti"/>
+        <a:font script="Khmr" typeface="DaunPenh"/>
+        <a:font script="Knda" typeface="Tunga"/>
+        <a:font script="Guru" typeface="Raavi"/>
+        <a:font script="Cans" typeface="Euphemia"/>
+        <a:font script="Cher" typeface="Plantagenet Cherokee"/>
+        <a:font script="Yiii" typeface="Microsoft Yi Baiti"/>
+        <a:font script="Tibt" typeface="Microsoft Himalaya"/>
+        <a:font script="Thaa" typeface="MV Boli"/>
+        <a:font script="Deva" typeface="Mangal"/>
+        <a:font script="Telu" typeface="Gautami"/>
+        <a:font script="Taml" typeface="Latha"/>
+        <a:font script="Syrc" typeface="Estrangelo Edessa"/>
+        <a:font script="Orya" typeface="Kalinga"/>
+        <a:font script="Mlym" typeface="Kartika"/>
+        <a:font script="Laoo" typeface="DokChampa"/>
+        <a:font script="Sinh" typeface="Iskoola Pota"/>
+        <a:font script="Mong" typeface="Mongolian Baiti"/>
+        <a:font script="Viet" typeface="Arial"/>
+        <a:font script="Uigh" typeface="Microsoft Uighur"/>
+        <a:font script="Geor" typeface="Sylfaen"/>
+      </a:minorFont>
+    </a:fontScheme>
+    <a:fmtScheme name="Office">
+      <a:fillStyleLst>
+        <a:solidFill>
+          <a:schemeClr val="phClr"/>
+        </a:solidFill>
+        <a:gradFill rotWithShape="1">
+          <a:gsLst>
+            <a:gs pos="0">
+              <a:schemeClr val="phClr">
+                <a:lumMod val="110000"/>
+                <a:satMod val="105000"/>
+                <a:tint val="67000"/>
+              </a:schemeClr>
+            </a:gs>
+            <a:gs pos="50000">
+              <a:schemeClr val="phClr">
+                <a:lumMod val="105000"/>
+                <a:satMod val="103000"/>
+                <a:tint val="73000"/>
+              </a:schemeClr>
+            </a:gs>
+            <a:gs pos="100000">
+              <a:schemeClr val="phClr">
+                <a:lumMod val="105000"/>
+                <a:satMod val="109000"/>
+                <a:tint val="81000"/>
+              </a:schemeClr>
+            </a:gs>
+          </a:gsLst>
+          <a:lin ang="5400000" scaled="0"/>
+        </a:gradFill>
+        <a:gradFill rotWithShape="1">
+          <a:gsLst>
+            <a:gs pos="0">
+              <a:schemeClr val="phClr">
+                <a:satMod val="103000"/>
+                <a:lumMod val="102000"/>
+                <a:tint val="94000"/>
+              </a:schemeClr>
+            </a:gs>
+            <a:gs pos="50000">
+              <a:schemeClr val="phClr">
+                <a:satMod val="110000"/>
+                <a:lumMod val="100000"/>
+                <a:shade val="100000"/>
+              </a:schemeClr>
+            </a:gs>
+            <a:gs pos="100000">
+              <a:schemeClr val="phClr">
+                <a:lumMod val="99000"/>
+                <a:satMod val="120000"/>
+                <a:shade val="78000"/>
+              </a:schemeClr>
+            </a:gs>
+          </a:gsLst>
+          <a:lin ang="5400000" scaled="0"/>
+        </a:gradFill>
+      </a:fillStyleLst>
+      <a:lnStyleLst>
+        <a:ln w="6350" cap="flat" cmpd="sng" algn="ctr">
+          <a:solidFill>
+            <a:schemeClr val="phClr"/>
+          </a:solidFill>
+          <a:prstDash val="solid"/>
+          <a:miter lim="800000"/>
+        </a:ln>
+        <a:ln w="12700" cap="flat" cmpd="sng" algn="ctr">
+          <a:solidFill>
+            <a:schemeClr val="phClr"/>
+          </a:solidFill>
+          <a:prstDash val="solid"/>
+          <a:miter lim="800000"/>
+        </a:ln>
+        <a:ln w="19050" cap="flat" cmpd="sng" algn="ctr">
+          <a:solidFill>
+            <a:schemeClr val="phClr"/>
+          </a:solidFill>
+          <a:prstDash val="solid"/>
+          <a:miter lim="800000"/>
+        </a:ln>
+      </a:lnStyleLst>
+      <a:effectStyleLst>
+        <a:effectStyle>
+          <a:effectLst/>
+        </a:effectStyle>
+        <a:effectStyle>
+          <a:effectLst/>
+        </a:effectStyle>
+        <a:effectStyle>
+          <a:effectLst>
+            <a:outerShdw blurRad="57150" dist="19050" dir="5400000" algn="ctr" rotWithShape="0">
+              <a:srgbClr val="000000">
+                <a:alpha val="63000"/>
+              </a:srgbClr>
+            </a:outerShdw>
+          </a:effectLst>
+        </a:effectStyle>
+      </a:effectStyleLst>
+      <a:bgFillStyleLst>
+        <a:solidFill>
+          <a:schemeClr val="phClr"/>
+        </a:solidFill>
+        <a:solidFill>
+          <a:schemeClr val="phClr">
+            <a:tint val="95000"/>
+            <a:satMod val="170000"/>
+          </a:schemeClr>
+        </a:solidFill>
+        <a:gradFill rotWithShape="1">
+          <a:gsLst>
+            <a:gs pos="0">
+              <a:schemeClr val="phClr">
+                <a:tint val="93000"/>
+                <a:satMod val="150000"/>
+                <a:shade val="98000"/>
+                <a:lumMod val="102000"/>
+              </a:schemeClr>
+            </a:gs>
+            <a:gs pos="50000">
+              <a:schemeClr val="phClr">
+                <a:tint val="98000"/>
+                <a:satMod val="130000"/>
+                <a:shade val="90000"/>
+                <a:lumMod val="103000"/>
+              </a:schemeClr>
+            </a:gs>
+            <a:gs pos="100000">
+              <a:schemeClr val="phClr">
+                <a:shade val="63000"/>
+                <a:satMod val="120000"/>
+              </a:schemeClr>
+            </a:gs>
+          </a:gsLst>
+          <a:lin ang="5400000" scaled="0"/>
+        </a:gradFill>
+      </a:bgFillStyleLst>
+    </a:fmtScheme>
+  </a:themeElements>
+  <a:objectDefaults/>
+  <a:extraClrSchemeLst/>
+  <a:extLst>
+    <a:ext uri="{05A4C25C-085E-4340-85A3-A5531E510DB2}">
+      <thm15:themeFamily xmlns:thm15="http://schemas.microsoft.com/office/thememl/2012/main" name="Office Theme" id="{62F939B6-93AF-4DB8-9C6B-D6C7DFDC589F}" vid="{4A3C46E8-61CC-4603-A589-7422A47A8E4A}"/>
+    </a:ext>
+  </a:extLst>
+</a:theme>
 </file>
</xml_diff>